<commit_message>
Update foodtree & k-means scripts
</commit_message>
<xml_diff>
--- a/docs/Poster/Poster_33x44_Rie.pptx
+++ b/docs/Poster/Poster_33x44_Rie.pptx
@@ -1562,332 +1562,6 @@
           <c:layoutTarget val="inner"/>
           <c:xMode val="edge"/>
           <c:yMode val="edge"/>
-          <c:x val="0.217186428229593"/>
-          <c:y val="6.7276620684465105E-2"/>
-          <c:w val="0.74713790216847809"/>
-          <c:h val="0.76845122306270808"/>
-        </c:manualLayout>
-      </c:layout>
-      <c:barChart>
-        <c:barDir val="col"/>
-        <c:grouping val="clustered"/>
-        <c:varyColors val="0"/>
-        <c:ser>
-          <c:idx val="0"/>
-          <c:order val="0"/>
-          <c:tx>
-            <c:strRef>
-              <c:f>Sheet1!$T$149</c:f>
-              <c:strCache>
-                <c:ptCount val="1"/>
-                <c:pt idx="0">
-                  <c:v>emmean</c:v>
-                </c:pt>
-              </c:strCache>
-            </c:strRef>
-          </c:tx>
-          <c:spPr>
-            <a:solidFill>
-              <a:schemeClr val="accent6">
-                <a:lumMod val="40000"/>
-                <a:lumOff val="60000"/>
-              </a:schemeClr>
-            </a:solidFill>
-            <a:ln>
-              <a:noFill/>
-            </a:ln>
-            <a:effectLst/>
-          </c:spPr>
-          <c:invertIfNegative val="0"/>
-          <c:errBars>
-            <c:errBarType val="both"/>
-            <c:errValType val="cust"/>
-            <c:noEndCap val="0"/>
-            <c:plus>
-              <c:numRef>
-                <c:f>Sheet1!$D$160:$D$163</c:f>
-                <c:numCache>
-                  <c:formatCode>General</c:formatCode>
-                  <c:ptCount val="4"/>
-                  <c:pt idx="0">
-                    <c:v>0.165029993120519</c:v>
-                  </c:pt>
-                  <c:pt idx="1">
-                    <c:v>0.198631664864556</c:v>
-                  </c:pt>
-                  <c:pt idx="2">
-                    <c:v>0.36657527711677601</c:v>
-                  </c:pt>
-                  <c:pt idx="3">
-                    <c:v>0.37673361200355499</c:v>
-                  </c:pt>
-                </c:numCache>
-              </c:numRef>
-            </c:plus>
-            <c:minus>
-              <c:numRef>
-                <c:f>Sheet1!$D$160:$D$163</c:f>
-                <c:numCache>
-                  <c:formatCode>General</c:formatCode>
-                  <c:ptCount val="4"/>
-                  <c:pt idx="0">
-                    <c:v>0.165029993120519</c:v>
-                  </c:pt>
-                  <c:pt idx="1">
-                    <c:v>0.198631664864556</c:v>
-                  </c:pt>
-                  <c:pt idx="2">
-                    <c:v>0.36657527711677601</c:v>
-                  </c:pt>
-                  <c:pt idx="3">
-                    <c:v>0.37673361200355499</c:v>
-                  </c:pt>
-                </c:numCache>
-              </c:numRef>
-            </c:minus>
-            <c:spPr>
-              <a:noFill/>
-              <a:ln w="25400" cap="flat" cmpd="sng" algn="ctr">
-                <a:solidFill>
-                  <a:schemeClr val="tx1">
-                    <a:lumMod val="65000"/>
-                    <a:lumOff val="35000"/>
-                  </a:schemeClr>
-                </a:solidFill>
-                <a:round/>
-              </a:ln>
-              <a:effectLst/>
-            </c:spPr>
-          </c:errBars>
-          <c:cat>
-            <c:strRef>
-              <c:f>Sheet1!$S$150:$S$153</c:f>
-              <c:strCache>
-                <c:ptCount val="4"/>
-                <c:pt idx="0">
-                  <c:v>DivNA</c:v>
-                </c:pt>
-                <c:pt idx="1">
-                  <c:v>Div0</c:v>
-                </c:pt>
-                <c:pt idx="2">
-                  <c:v>Div1</c:v>
-                </c:pt>
-                <c:pt idx="3">
-                  <c:v>Div2</c:v>
-                </c:pt>
-              </c:strCache>
-            </c:strRef>
-          </c:cat>
-          <c:val>
-            <c:numRef>
-              <c:f>Sheet1!$T$150:$T$153</c:f>
-              <c:numCache>
-                <c:formatCode>0</c:formatCode>
-                <c:ptCount val="4"/>
-                <c:pt idx="0">
-                  <c:v>29.833039894761601</c:v>
-                </c:pt>
-                <c:pt idx="1">
-                  <c:v>29.701989237987501</c:v>
-                </c:pt>
-                <c:pt idx="2">
-                  <c:v>28.923320343383399</c:v>
-                </c:pt>
-                <c:pt idx="3">
-                  <c:v>27.695775047685299</c:v>
-                </c:pt>
-              </c:numCache>
-            </c:numRef>
-          </c:val>
-          <c:extLst>
-            <c:ext xmlns:c16="http://schemas.microsoft.com/office/drawing/2014/chart" uri="{C3380CC4-5D6E-409C-BE32-E72D297353CC}">
-              <c16:uniqueId val="{00000000-E3FB-4E5E-85D6-A43894FF4EDD}"/>
-            </c:ext>
-          </c:extLst>
-        </c:ser>
-        <c:dLbls>
-          <c:showLegendKey val="0"/>
-          <c:showVal val="0"/>
-          <c:showCatName val="0"/>
-          <c:showSerName val="0"/>
-          <c:showPercent val="0"/>
-          <c:showBubbleSize val="0"/>
-        </c:dLbls>
-        <c:gapWidth val="149"/>
-        <c:overlap val="-45"/>
-        <c:axId val="477875424"/>
-        <c:axId val="477873624"/>
-      </c:barChart>
-      <c:catAx>
-        <c:axId val="477875424"/>
-        <c:scaling>
-          <c:orientation val="minMax"/>
-        </c:scaling>
-        <c:delete val="0"/>
-        <c:axPos val="b"/>
-        <c:numFmt formatCode="General" sourceLinked="1"/>
-        <c:majorTickMark val="none"/>
-        <c:minorTickMark val="none"/>
-        <c:tickLblPos val="nextTo"/>
-        <c:spPr>
-          <a:noFill/>
-          <a:ln w="9525" cap="flat" cmpd="sng" algn="ctr">
-            <a:solidFill>
-              <a:schemeClr val="bg1">
-                <a:lumMod val="65000"/>
-              </a:schemeClr>
-            </a:solidFill>
-            <a:round/>
-          </a:ln>
-          <a:effectLst/>
-        </c:spPr>
-        <c:txPr>
-          <a:bodyPr rot="-60000000" spcFirstLastPara="1" vertOverflow="ellipsis" vert="horz" wrap="square" anchor="ctr" anchorCtr="1"/>
-          <a:lstStyle/>
-          <a:p>
-            <a:pPr>
-              <a:defRPr sz="2600" b="0" i="0" u="none" strike="noStrike" kern="1200" baseline="0">
-                <a:solidFill>
-                  <a:schemeClr val="tx1">
-                    <a:lumMod val="65000"/>
-                    <a:lumOff val="35000"/>
-                  </a:schemeClr>
-                </a:solidFill>
-                <a:latin typeface="Arial" panose="020B0604020202020204" pitchFamily="34" charset="0"/>
-                <a:ea typeface="+mn-ea"/>
-                <a:cs typeface="Arial" panose="020B0604020202020204" pitchFamily="34" charset="0"/>
-              </a:defRPr>
-            </a:pPr>
-            <a:endParaRPr lang="en-US"/>
-          </a:p>
-        </c:txPr>
-        <c:crossAx val="477873624"/>
-        <c:crosses val="autoZero"/>
-        <c:auto val="1"/>
-        <c:lblAlgn val="ctr"/>
-        <c:lblOffset val="100"/>
-        <c:noMultiLvlLbl val="0"/>
-      </c:catAx>
-      <c:valAx>
-        <c:axId val="477873624"/>
-        <c:scaling>
-          <c:orientation val="minMax"/>
-          <c:max val="32"/>
-          <c:min val="26"/>
-        </c:scaling>
-        <c:delete val="0"/>
-        <c:axPos val="l"/>
-        <c:numFmt formatCode="0" sourceLinked="1"/>
-        <c:majorTickMark val="none"/>
-        <c:minorTickMark val="none"/>
-        <c:tickLblPos val="nextTo"/>
-        <c:spPr>
-          <a:noFill/>
-          <a:ln>
-            <a:noFill/>
-          </a:ln>
-          <a:effectLst/>
-        </c:spPr>
-        <c:txPr>
-          <a:bodyPr rot="-60000000" spcFirstLastPara="1" vertOverflow="ellipsis" vert="horz" wrap="square" anchor="ctr" anchorCtr="1"/>
-          <a:lstStyle/>
-          <a:p>
-            <a:pPr>
-              <a:defRPr sz="2600" b="0" i="0" u="none" strike="noStrike" kern="1200" baseline="0">
-                <a:solidFill>
-                  <a:schemeClr val="tx1">
-                    <a:lumMod val="65000"/>
-                    <a:lumOff val="35000"/>
-                  </a:schemeClr>
-                </a:solidFill>
-                <a:latin typeface="Arial" panose="020B0604020202020204" pitchFamily="34" charset="0"/>
-                <a:ea typeface="+mn-ea"/>
-                <a:cs typeface="Arial" panose="020B0604020202020204" pitchFamily="34" charset="0"/>
-              </a:defRPr>
-            </a:pPr>
-            <a:endParaRPr lang="en-US"/>
-          </a:p>
-        </c:txPr>
-        <c:crossAx val="477875424"/>
-        <c:crosses val="autoZero"/>
-        <c:crossBetween val="between"/>
-        <c:majorUnit val="1"/>
-      </c:valAx>
-      <c:spPr>
-        <a:noFill/>
-        <a:ln>
-          <a:solidFill>
-            <a:schemeClr val="bg1">
-              <a:lumMod val="65000"/>
-            </a:schemeClr>
-          </a:solidFill>
-        </a:ln>
-        <a:effectLst/>
-      </c:spPr>
-    </c:plotArea>
-    <c:plotVisOnly val="1"/>
-    <c:dispBlanksAs val="gap"/>
-    <c:extLst>
-      <c:ext xmlns:c16r3="http://schemas.microsoft.com/office/drawing/2017/03/chart" uri="{56B9EC1D-385E-4148-901F-78D8002777C0}">
-        <c16r3:dataDisplayOptions16>
-          <c16r3:dispNaAsBlank val="1"/>
-        </c16r3:dataDisplayOptions16>
-      </c:ext>
-    </c:extLst>
-    <c:showDLblsOverMax val="0"/>
-  </c:chart>
-  <c:spPr>
-    <a:solidFill>
-      <a:schemeClr val="bg1"/>
-    </a:solidFill>
-    <a:ln w="9525" cap="flat" cmpd="sng" algn="ctr">
-      <a:noFill/>
-      <a:round/>
-    </a:ln>
-    <a:effectLst/>
-  </c:spPr>
-  <c:txPr>
-    <a:bodyPr/>
-    <a:lstStyle/>
-    <a:p>
-      <a:pPr>
-        <a:defRPr sz="2600">
-          <a:latin typeface="Arial" panose="020B0604020202020204" pitchFamily="34" charset="0"/>
-          <a:cs typeface="Arial" panose="020B0604020202020204" pitchFamily="34" charset="0"/>
-        </a:defRPr>
-      </a:pPr>
-      <a:endParaRPr lang="en-US"/>
-    </a:p>
-  </c:txPr>
-  <c:externalData r:id="rId3">
-    <c:autoUpdate val="0"/>
-  </c:externalData>
-  <c:userShapes r:id="rId4"/>
-</c:chartSpace>
-</file>
-
-<file path=ppt/charts/chart3.xml><?xml version="1.0" encoding="utf-8"?>
-<c:chartSpace xmlns:c="http://schemas.openxmlformats.org/drawingml/2006/chart" xmlns:a="http://schemas.openxmlformats.org/drawingml/2006/main" xmlns:r="http://schemas.openxmlformats.org/officeDocument/2006/relationships" xmlns:c16r2="http://schemas.microsoft.com/office/drawing/2015/06/chart">
-  <c:date1904 val="0"/>
-  <c:lang val="en-US"/>
-  <c:roundedCorners val="0"/>
-  <mc:AlternateContent xmlns:mc="http://schemas.openxmlformats.org/markup-compatibility/2006">
-    <mc:Choice xmlns:c14="http://schemas.microsoft.com/office/drawing/2007/8/2/chart" Requires="c14">
-      <c14:style val="102"/>
-    </mc:Choice>
-    <mc:Fallback>
-      <c:style val="2"/>
-    </mc:Fallback>
-  </mc:AlternateContent>
-  <c:chart>
-    <c:autoTitleDeleted val="1"/>
-    <c:plotArea>
-      <c:layout>
-        <c:manualLayout>
-          <c:layoutTarget val="inner"/>
-          <c:xMode val="edge"/>
-          <c:yMode val="edge"/>
           <c:x val="0.26583506859585976"/>
           <c:y val="6.7276620684465105E-2"/>
           <c:w val="0.69848926180221127"/>
@@ -2233,46 +1907,6 @@
 </file>
 
 <file path=ppt/charts/colors2.xml><?xml version="1.0" encoding="utf-8"?>
-<cs:colorStyle xmlns:cs="http://schemas.microsoft.com/office/drawing/2012/chartStyle" xmlns:a="http://schemas.openxmlformats.org/drawingml/2006/main" meth="cycle" id="10">
-  <a:schemeClr val="accent1"/>
-  <a:schemeClr val="accent2"/>
-  <a:schemeClr val="accent3"/>
-  <a:schemeClr val="accent4"/>
-  <a:schemeClr val="accent5"/>
-  <a:schemeClr val="accent6"/>
-  <cs:variation/>
-  <cs:variation>
-    <a:lumMod val="60000"/>
-  </cs:variation>
-  <cs:variation>
-    <a:lumMod val="80000"/>
-    <a:lumOff val="20000"/>
-  </cs:variation>
-  <cs:variation>
-    <a:lumMod val="80000"/>
-  </cs:variation>
-  <cs:variation>
-    <a:lumMod val="60000"/>
-    <a:lumOff val="40000"/>
-  </cs:variation>
-  <cs:variation>
-    <a:lumMod val="50000"/>
-  </cs:variation>
-  <cs:variation>
-    <a:lumMod val="70000"/>
-    <a:lumOff val="30000"/>
-  </cs:variation>
-  <cs:variation>
-    <a:lumMod val="70000"/>
-  </cs:variation>
-  <cs:variation>
-    <a:lumMod val="50000"/>
-    <a:lumOff val="50000"/>
-  </cs:variation>
-</cs:colorStyle>
-</file>
-
-<file path=ppt/charts/colors3.xml><?xml version="1.0" encoding="utf-8"?>
 <cs:colorStyle xmlns:cs="http://schemas.microsoft.com/office/drawing/2012/chartStyle" xmlns:a="http://schemas.openxmlformats.org/drawingml/2006/main" meth="cycle" id="10">
   <a:schemeClr val="accent1"/>
   <a:schemeClr val="accent2"/>
@@ -3318,509 +2952,6 @@
 </cs:chartStyle>
 </file>
 
-<file path=ppt/charts/style3.xml><?xml version="1.0" encoding="utf-8"?>
-<cs:chartStyle xmlns:cs="http://schemas.microsoft.com/office/drawing/2012/chartStyle" xmlns:a="http://schemas.openxmlformats.org/drawingml/2006/main" id="201">
-  <cs:axisTitle>
-    <cs:lnRef idx="0"/>
-    <cs:fillRef idx="0"/>
-    <cs:effectRef idx="0"/>
-    <cs:fontRef idx="minor">
-      <a:schemeClr val="tx1">
-        <a:lumMod val="65000"/>
-        <a:lumOff val="35000"/>
-      </a:schemeClr>
-    </cs:fontRef>
-    <cs:defRPr sz="1000" kern="1200"/>
-  </cs:axisTitle>
-  <cs:categoryAxis>
-    <cs:lnRef idx="0"/>
-    <cs:fillRef idx="0"/>
-    <cs:effectRef idx="0"/>
-    <cs:fontRef idx="minor">
-      <a:schemeClr val="tx1">
-        <a:lumMod val="65000"/>
-        <a:lumOff val="35000"/>
-      </a:schemeClr>
-    </cs:fontRef>
-    <cs:spPr>
-      <a:ln w="9525" cap="flat" cmpd="sng" algn="ctr">
-        <a:solidFill>
-          <a:schemeClr val="tx1">
-            <a:lumMod val="15000"/>
-            <a:lumOff val="85000"/>
-          </a:schemeClr>
-        </a:solidFill>
-        <a:round/>
-      </a:ln>
-    </cs:spPr>
-    <cs:defRPr sz="900" kern="1200"/>
-  </cs:categoryAxis>
-  <cs:chartArea mods="allowNoFillOverride allowNoLineOverride">
-    <cs:lnRef idx="0"/>
-    <cs:fillRef idx="0"/>
-    <cs:effectRef idx="0"/>
-    <cs:fontRef idx="minor">
-      <a:schemeClr val="tx1"/>
-    </cs:fontRef>
-    <cs:spPr>
-      <a:solidFill>
-        <a:schemeClr val="bg1"/>
-      </a:solidFill>
-      <a:ln w="9525" cap="flat" cmpd="sng" algn="ctr">
-        <a:solidFill>
-          <a:schemeClr val="tx1">
-            <a:lumMod val="15000"/>
-            <a:lumOff val="85000"/>
-          </a:schemeClr>
-        </a:solidFill>
-        <a:round/>
-      </a:ln>
-    </cs:spPr>
-    <cs:defRPr sz="1000" kern="1200"/>
-  </cs:chartArea>
-  <cs:dataLabel>
-    <cs:lnRef idx="0"/>
-    <cs:fillRef idx="0"/>
-    <cs:effectRef idx="0"/>
-    <cs:fontRef idx="minor">
-      <a:schemeClr val="tx1">
-        <a:lumMod val="75000"/>
-        <a:lumOff val="25000"/>
-      </a:schemeClr>
-    </cs:fontRef>
-    <cs:defRPr sz="900" kern="1200"/>
-  </cs:dataLabel>
-  <cs:dataLabelCallout>
-    <cs:lnRef idx="0"/>
-    <cs:fillRef idx="0"/>
-    <cs:effectRef idx="0"/>
-    <cs:fontRef idx="minor">
-      <a:schemeClr val="dk1">
-        <a:lumMod val="65000"/>
-        <a:lumOff val="35000"/>
-      </a:schemeClr>
-    </cs:fontRef>
-    <cs:spPr>
-      <a:solidFill>
-        <a:schemeClr val="lt1"/>
-      </a:solidFill>
-      <a:ln>
-        <a:solidFill>
-          <a:schemeClr val="dk1">
-            <a:lumMod val="25000"/>
-            <a:lumOff val="75000"/>
-          </a:schemeClr>
-        </a:solidFill>
-      </a:ln>
-    </cs:spPr>
-    <cs:defRPr sz="900" kern="1200"/>
-    <cs:bodyPr rot="0" spcFirstLastPara="1" vertOverflow="clip" horzOverflow="clip" vert="horz" wrap="square" lIns="36576" tIns="18288" rIns="36576" bIns="18288" anchor="ctr" anchorCtr="1">
-      <a:spAutoFit/>
-    </cs:bodyPr>
-  </cs:dataLabelCallout>
-  <cs:dataPoint>
-    <cs:lnRef idx="0"/>
-    <cs:fillRef idx="1">
-      <cs:styleClr val="auto"/>
-    </cs:fillRef>
-    <cs:effectRef idx="0"/>
-    <cs:fontRef idx="minor">
-      <a:schemeClr val="tx1"/>
-    </cs:fontRef>
-  </cs:dataPoint>
-  <cs:dataPoint3D>
-    <cs:lnRef idx="0"/>
-    <cs:fillRef idx="1">
-      <cs:styleClr val="auto"/>
-    </cs:fillRef>
-    <cs:effectRef idx="0"/>
-    <cs:fontRef idx="minor">
-      <a:schemeClr val="tx1"/>
-    </cs:fontRef>
-  </cs:dataPoint3D>
-  <cs:dataPointLine>
-    <cs:lnRef idx="0">
-      <cs:styleClr val="auto"/>
-    </cs:lnRef>
-    <cs:fillRef idx="1"/>
-    <cs:effectRef idx="0"/>
-    <cs:fontRef idx="minor">
-      <a:schemeClr val="tx1"/>
-    </cs:fontRef>
-    <cs:spPr>
-      <a:ln w="28575" cap="rnd">
-        <a:solidFill>
-          <a:schemeClr val="phClr"/>
-        </a:solidFill>
-        <a:round/>
-      </a:ln>
-    </cs:spPr>
-  </cs:dataPointLine>
-  <cs:dataPointMarker>
-    <cs:lnRef idx="0">
-      <cs:styleClr val="auto"/>
-    </cs:lnRef>
-    <cs:fillRef idx="1">
-      <cs:styleClr val="auto"/>
-    </cs:fillRef>
-    <cs:effectRef idx="0"/>
-    <cs:fontRef idx="minor">
-      <a:schemeClr val="tx1"/>
-    </cs:fontRef>
-    <cs:spPr>
-      <a:ln w="9525">
-        <a:solidFill>
-          <a:schemeClr val="phClr"/>
-        </a:solidFill>
-      </a:ln>
-    </cs:spPr>
-  </cs:dataPointMarker>
-  <cs:dataPointMarkerLayout symbol="circle" size="5"/>
-  <cs:dataPointWireframe>
-    <cs:lnRef idx="0">
-      <cs:styleClr val="auto"/>
-    </cs:lnRef>
-    <cs:fillRef idx="1"/>
-    <cs:effectRef idx="0"/>
-    <cs:fontRef idx="minor">
-      <a:schemeClr val="tx1"/>
-    </cs:fontRef>
-    <cs:spPr>
-      <a:ln w="9525" cap="rnd">
-        <a:solidFill>
-          <a:schemeClr val="phClr"/>
-        </a:solidFill>
-        <a:round/>
-      </a:ln>
-    </cs:spPr>
-  </cs:dataPointWireframe>
-  <cs:dataTable>
-    <cs:lnRef idx="0"/>
-    <cs:fillRef idx="0"/>
-    <cs:effectRef idx="0"/>
-    <cs:fontRef idx="minor">
-      <a:schemeClr val="tx1">
-        <a:lumMod val="65000"/>
-        <a:lumOff val="35000"/>
-      </a:schemeClr>
-    </cs:fontRef>
-    <cs:spPr>
-      <a:noFill/>
-      <a:ln w="9525" cap="flat" cmpd="sng" algn="ctr">
-        <a:solidFill>
-          <a:schemeClr val="tx1">
-            <a:lumMod val="15000"/>
-            <a:lumOff val="85000"/>
-          </a:schemeClr>
-        </a:solidFill>
-        <a:round/>
-      </a:ln>
-    </cs:spPr>
-    <cs:defRPr sz="900" kern="1200"/>
-  </cs:dataTable>
-  <cs:downBar>
-    <cs:lnRef idx="0"/>
-    <cs:fillRef idx="0"/>
-    <cs:effectRef idx="0"/>
-    <cs:fontRef idx="minor">
-      <a:schemeClr val="dk1"/>
-    </cs:fontRef>
-    <cs:spPr>
-      <a:solidFill>
-        <a:schemeClr val="dk1">
-          <a:lumMod val="65000"/>
-          <a:lumOff val="35000"/>
-        </a:schemeClr>
-      </a:solidFill>
-      <a:ln w="9525">
-        <a:solidFill>
-          <a:schemeClr val="tx1">
-            <a:lumMod val="65000"/>
-            <a:lumOff val="35000"/>
-          </a:schemeClr>
-        </a:solidFill>
-      </a:ln>
-    </cs:spPr>
-  </cs:downBar>
-  <cs:dropLine>
-    <cs:lnRef idx="0"/>
-    <cs:fillRef idx="0"/>
-    <cs:effectRef idx="0"/>
-    <cs:fontRef idx="minor">
-      <a:schemeClr val="tx1"/>
-    </cs:fontRef>
-    <cs:spPr>
-      <a:ln w="9525" cap="flat" cmpd="sng" algn="ctr">
-        <a:solidFill>
-          <a:schemeClr val="tx1">
-            <a:lumMod val="35000"/>
-            <a:lumOff val="65000"/>
-          </a:schemeClr>
-        </a:solidFill>
-        <a:round/>
-      </a:ln>
-    </cs:spPr>
-  </cs:dropLine>
-  <cs:errorBar>
-    <cs:lnRef idx="0"/>
-    <cs:fillRef idx="0"/>
-    <cs:effectRef idx="0"/>
-    <cs:fontRef idx="minor">
-      <a:schemeClr val="tx1"/>
-    </cs:fontRef>
-    <cs:spPr>
-      <a:ln w="9525" cap="flat" cmpd="sng" algn="ctr">
-        <a:solidFill>
-          <a:schemeClr val="tx1">
-            <a:lumMod val="65000"/>
-            <a:lumOff val="35000"/>
-          </a:schemeClr>
-        </a:solidFill>
-        <a:round/>
-      </a:ln>
-    </cs:spPr>
-  </cs:errorBar>
-  <cs:floor>
-    <cs:lnRef idx="0"/>
-    <cs:fillRef idx="0"/>
-    <cs:effectRef idx="0"/>
-    <cs:fontRef idx="minor">
-      <a:schemeClr val="tx1"/>
-    </cs:fontRef>
-    <cs:spPr>
-      <a:noFill/>
-      <a:ln>
-        <a:noFill/>
-      </a:ln>
-    </cs:spPr>
-  </cs:floor>
-  <cs:gridlineMajor>
-    <cs:lnRef idx="0"/>
-    <cs:fillRef idx="0"/>
-    <cs:effectRef idx="0"/>
-    <cs:fontRef idx="minor">
-      <a:schemeClr val="tx1"/>
-    </cs:fontRef>
-    <cs:spPr>
-      <a:ln w="9525" cap="flat" cmpd="sng" algn="ctr">
-        <a:solidFill>
-          <a:schemeClr val="tx1">
-            <a:lumMod val="15000"/>
-            <a:lumOff val="85000"/>
-          </a:schemeClr>
-        </a:solidFill>
-        <a:round/>
-      </a:ln>
-    </cs:spPr>
-  </cs:gridlineMajor>
-  <cs:gridlineMinor>
-    <cs:lnRef idx="0"/>
-    <cs:fillRef idx="0"/>
-    <cs:effectRef idx="0"/>
-    <cs:fontRef idx="minor">
-      <a:schemeClr val="tx1"/>
-    </cs:fontRef>
-    <cs:spPr>
-      <a:ln w="9525" cap="flat" cmpd="sng" algn="ctr">
-        <a:solidFill>
-          <a:schemeClr val="tx1">
-            <a:lumMod val="5000"/>
-            <a:lumOff val="95000"/>
-          </a:schemeClr>
-        </a:solidFill>
-        <a:round/>
-      </a:ln>
-    </cs:spPr>
-  </cs:gridlineMinor>
-  <cs:hiLoLine>
-    <cs:lnRef idx="0"/>
-    <cs:fillRef idx="0"/>
-    <cs:effectRef idx="0"/>
-    <cs:fontRef idx="minor">
-      <a:schemeClr val="tx1"/>
-    </cs:fontRef>
-    <cs:spPr>
-      <a:ln w="9525" cap="flat" cmpd="sng" algn="ctr">
-        <a:solidFill>
-          <a:schemeClr val="tx1">
-            <a:lumMod val="75000"/>
-            <a:lumOff val="25000"/>
-          </a:schemeClr>
-        </a:solidFill>
-        <a:round/>
-      </a:ln>
-    </cs:spPr>
-  </cs:hiLoLine>
-  <cs:leaderLine>
-    <cs:lnRef idx="0"/>
-    <cs:fillRef idx="0"/>
-    <cs:effectRef idx="0"/>
-    <cs:fontRef idx="minor">
-      <a:schemeClr val="tx1"/>
-    </cs:fontRef>
-    <cs:spPr>
-      <a:ln w="9525" cap="flat" cmpd="sng" algn="ctr">
-        <a:solidFill>
-          <a:schemeClr val="tx1">
-            <a:lumMod val="35000"/>
-            <a:lumOff val="65000"/>
-          </a:schemeClr>
-        </a:solidFill>
-        <a:round/>
-      </a:ln>
-    </cs:spPr>
-  </cs:leaderLine>
-  <cs:legend>
-    <cs:lnRef idx="0"/>
-    <cs:fillRef idx="0"/>
-    <cs:effectRef idx="0"/>
-    <cs:fontRef idx="minor">
-      <a:schemeClr val="tx1">
-        <a:lumMod val="65000"/>
-        <a:lumOff val="35000"/>
-      </a:schemeClr>
-    </cs:fontRef>
-    <cs:defRPr sz="900" kern="1200"/>
-  </cs:legend>
-  <cs:plotArea mods="allowNoFillOverride allowNoLineOverride">
-    <cs:lnRef idx="0"/>
-    <cs:fillRef idx="0"/>
-    <cs:effectRef idx="0"/>
-    <cs:fontRef idx="minor">
-      <a:schemeClr val="tx1"/>
-    </cs:fontRef>
-  </cs:plotArea>
-  <cs:plotArea3D mods="allowNoFillOverride allowNoLineOverride">
-    <cs:lnRef idx="0"/>
-    <cs:fillRef idx="0"/>
-    <cs:effectRef idx="0"/>
-    <cs:fontRef idx="minor">
-      <a:schemeClr val="tx1"/>
-    </cs:fontRef>
-  </cs:plotArea3D>
-  <cs:seriesAxis>
-    <cs:lnRef idx="0"/>
-    <cs:fillRef idx="0"/>
-    <cs:effectRef idx="0"/>
-    <cs:fontRef idx="minor">
-      <a:schemeClr val="tx1">
-        <a:lumMod val="65000"/>
-        <a:lumOff val="35000"/>
-      </a:schemeClr>
-    </cs:fontRef>
-    <cs:defRPr sz="900" kern="1200"/>
-  </cs:seriesAxis>
-  <cs:seriesLine>
-    <cs:lnRef idx="0"/>
-    <cs:fillRef idx="0"/>
-    <cs:effectRef idx="0"/>
-    <cs:fontRef idx="minor">
-      <a:schemeClr val="tx1"/>
-    </cs:fontRef>
-    <cs:spPr>
-      <a:ln w="9525" cap="flat" cmpd="sng" algn="ctr">
-        <a:solidFill>
-          <a:schemeClr val="tx1">
-            <a:lumMod val="35000"/>
-            <a:lumOff val="65000"/>
-          </a:schemeClr>
-        </a:solidFill>
-        <a:round/>
-      </a:ln>
-    </cs:spPr>
-  </cs:seriesLine>
-  <cs:title>
-    <cs:lnRef idx="0"/>
-    <cs:fillRef idx="0"/>
-    <cs:effectRef idx="0"/>
-    <cs:fontRef idx="minor">
-      <a:schemeClr val="tx1">
-        <a:lumMod val="65000"/>
-        <a:lumOff val="35000"/>
-      </a:schemeClr>
-    </cs:fontRef>
-    <cs:defRPr sz="1400" b="0" kern="1200" spc="0" baseline="0"/>
-  </cs:title>
-  <cs:trendline>
-    <cs:lnRef idx="0">
-      <cs:styleClr val="auto"/>
-    </cs:lnRef>
-    <cs:fillRef idx="0"/>
-    <cs:effectRef idx="0"/>
-    <cs:fontRef idx="minor">
-      <a:schemeClr val="tx1"/>
-    </cs:fontRef>
-    <cs:spPr>
-      <a:ln w="19050" cap="rnd">
-        <a:solidFill>
-          <a:schemeClr val="phClr"/>
-        </a:solidFill>
-        <a:prstDash val="sysDot"/>
-      </a:ln>
-    </cs:spPr>
-  </cs:trendline>
-  <cs:trendlineLabel>
-    <cs:lnRef idx="0"/>
-    <cs:fillRef idx="0"/>
-    <cs:effectRef idx="0"/>
-    <cs:fontRef idx="minor">
-      <a:schemeClr val="tx1">
-        <a:lumMod val="65000"/>
-        <a:lumOff val="35000"/>
-      </a:schemeClr>
-    </cs:fontRef>
-    <cs:defRPr sz="900" kern="1200"/>
-  </cs:trendlineLabel>
-  <cs:upBar>
-    <cs:lnRef idx="0"/>
-    <cs:fillRef idx="0"/>
-    <cs:effectRef idx="0"/>
-    <cs:fontRef idx="minor">
-      <a:schemeClr val="dk1"/>
-    </cs:fontRef>
-    <cs:spPr>
-      <a:solidFill>
-        <a:schemeClr val="lt1"/>
-      </a:solidFill>
-      <a:ln w="9525">
-        <a:solidFill>
-          <a:schemeClr val="tx1">
-            <a:lumMod val="15000"/>
-            <a:lumOff val="85000"/>
-          </a:schemeClr>
-        </a:solidFill>
-      </a:ln>
-    </cs:spPr>
-  </cs:upBar>
-  <cs:valueAxis>
-    <cs:lnRef idx="0"/>
-    <cs:fillRef idx="0"/>
-    <cs:effectRef idx="0"/>
-    <cs:fontRef idx="minor">
-      <a:schemeClr val="tx1">
-        <a:lumMod val="65000"/>
-        <a:lumOff val="35000"/>
-      </a:schemeClr>
-    </cs:fontRef>
-    <cs:defRPr sz="900" kern="1200"/>
-  </cs:valueAxis>
-  <cs:wall>
-    <cs:lnRef idx="0"/>
-    <cs:fillRef idx="0"/>
-    <cs:effectRef idx="0"/>
-    <cs:fontRef idx="minor">
-      <a:schemeClr val="tx1"/>
-    </cs:fontRef>
-    <cs:spPr>
-      <a:noFill/>
-      <a:ln>
-        <a:noFill/>
-      </a:ln>
-    </cs:spPr>
-  </cs:wall>
-</cs:chartStyle>
-</file>
-
 <file path=ppt/drawings/drawing1.xml><?xml version="1.0" encoding="utf-8"?>
 <c:userShapes xmlns:c="http://schemas.openxmlformats.org/drawingml/2006/chart">
   <cdr:relSizeAnchor xmlns:cdr="http://schemas.openxmlformats.org/drawingml/2006/chartDrawing">
@@ -3858,7 +2989,7 @@
         <a:p xmlns:a="http://schemas.openxmlformats.org/drawingml/2006/main">
           <a:pPr algn="ctr"/>
           <a:r>
-            <a:rPr lang="en-US" sz="2600">
+            <a:rPr lang="en-US" sz="2600" dirty="0">
               <a:solidFill>
                 <a:schemeClr val="tx1">
                   <a:lumMod val="65000"/>
@@ -3878,72 +3009,6 @@
 </file>
 
 <file path=ppt/drawings/drawing2.xml><?xml version="1.0" encoding="utf-8"?>
-<c:userShapes xmlns:c="http://schemas.openxmlformats.org/drawingml/2006/chart">
-  <cdr:relSizeAnchor xmlns:cdr="http://schemas.openxmlformats.org/drawingml/2006/chartDrawing">
-    <cdr:from>
-      <cdr:x>0.01311</cdr:x>
-      <cdr:y>0.01291</cdr:y>
-    </cdr:from>
-    <cdr:to>
-      <cdr:x>0.1131</cdr:x>
-      <cdr:y>0.90007</cdr:y>
-    </cdr:to>
-    <cdr:sp macro="" textlink="">
-      <cdr:nvSpPr>
-        <cdr:cNvPr id="2" name="TextBox 1">
-          <a:extLst xmlns:a="http://schemas.openxmlformats.org/drawingml/2006/main">
-            <a:ext uri="{FF2B5EF4-FFF2-40B4-BE49-F238E27FC236}">
-              <a16:creationId xmlns:a16="http://schemas.microsoft.com/office/drawing/2014/main" id="{855F7DC9-3DD0-48DB-EA7D-4FA42F8645E7}"/>
-            </a:ext>
-          </a:extLst>
-        </cdr:cNvPr>
-        <cdr:cNvSpPr txBox="1"/>
-      </cdr:nvSpPr>
-      <cdr:spPr>
-        <a:xfrm xmlns:a="http://schemas.openxmlformats.org/drawingml/2006/main" rot="16200000">
-          <a:off x="-1939027" y="2090772"/>
-          <a:ext cx="4683117" cy="637876"/>
-        </a:xfrm>
-        <a:prstGeom xmlns:a="http://schemas.openxmlformats.org/drawingml/2006/main" prst="rect">
-          <a:avLst/>
-        </a:prstGeom>
-      </cdr:spPr>
-      <cdr:txBody>
-        <a:bodyPr xmlns:a="http://schemas.openxmlformats.org/drawingml/2006/main" vertOverflow="clip" wrap="none" rtlCol="0"/>
-        <a:lstStyle xmlns:a="http://schemas.openxmlformats.org/drawingml/2006/main"/>
-        <a:p xmlns:a="http://schemas.openxmlformats.org/drawingml/2006/main">
-          <a:pPr algn="ctr"/>
-          <a:r>
-            <a:rPr lang="en-US" sz="2800">
-              <a:solidFill>
-                <a:schemeClr val="tx1">
-                  <a:lumMod val="65000"/>
-                  <a:lumOff val="35000"/>
-                </a:schemeClr>
-              </a:solidFill>
-              <a:latin typeface="Arial" panose="020B0604020202020204" pitchFamily="34" charset="0"/>
-              <a:cs typeface="Arial" panose="020B0604020202020204" pitchFamily="34" charset="0"/>
-            </a:rPr>
-            <a:t>BMI</a:t>
-          </a:r>
-          <a:endParaRPr lang="en-US" sz="1050">
-            <a:solidFill>
-              <a:schemeClr val="tx1">
-                <a:lumMod val="65000"/>
-                <a:lumOff val="35000"/>
-              </a:schemeClr>
-            </a:solidFill>
-            <a:latin typeface="Arial" panose="020B0604020202020204" pitchFamily="34" charset="0"/>
-            <a:cs typeface="Arial" panose="020B0604020202020204" pitchFamily="34" charset="0"/>
-          </a:endParaRPr>
-        </a:p>
-      </cdr:txBody>
-    </cdr:sp>
-  </cdr:relSizeAnchor>
-</c:userShapes>
-</file>
-
-<file path=ppt/drawings/drawing3.xml><?xml version="1.0" encoding="utf-8"?>
 <c:userShapes xmlns:c="http://schemas.openxmlformats.org/drawingml/2006/chart">
   <cdr:relSizeAnchor xmlns:cdr="http://schemas.openxmlformats.org/drawingml/2006/chartDrawing">
     <cdr:from>
@@ -3980,7 +3045,7 @@
         <a:p xmlns:a="http://schemas.openxmlformats.org/drawingml/2006/main">
           <a:pPr algn="ctr"/>
           <a:r>
-            <a:rPr lang="en-US" sz="2600">
+            <a:rPr lang="en-US" sz="2600" dirty="0">
               <a:solidFill>
                 <a:schemeClr val="tx1">
                   <a:lumMod val="65000"/>
@@ -4081,7 +3146,7 @@
           <a:p>
             <a:fld id="{7A3435CD-08FE-4D3C-A26F-E657E118D405}" type="datetimeFigureOut">
               <a:rPr lang="en-AU" smtClean="0"/>
-              <a:t>27/04/2023</a:t>
+              <a:t>28/04/2023</a:t>
             </a:fld>
             <a:endParaRPr lang="en-AU" dirty="0"/>
           </a:p>
@@ -4580,9 +3645,9 @@
           <a:p>
             <a:fld id="{A9DB9294-D83F-45CE-B910-2413C32C8D97}" type="datetimeFigureOut">
               <a:rPr lang="en-US" smtClean="0"/>
-              <a:t>4/27/2023</a:t>
+              <a:t>4/28/2023</a:t>
             </a:fld>
-            <a:endParaRPr lang="en-US"/>
+            <a:endParaRPr lang="en-US" dirty="0"/>
           </a:p>
         </p:txBody>
       </p:sp>
@@ -4607,7 +3672,7 @@
           <a:bodyPr/>
           <a:lstStyle/>
           <a:p>
-            <a:endParaRPr lang="en-US"/>
+            <a:endParaRPr lang="en-US" dirty="0"/>
           </a:p>
         </p:txBody>
       </p:sp>
@@ -4636,7 +3701,7 @@
               <a:rPr lang="en-US" smtClean="0"/>
               <a:t>‹#›</a:t>
             </a:fld>
-            <a:endParaRPr lang="en-US"/>
+            <a:endParaRPr lang="en-US" dirty="0"/>
           </a:p>
         </p:txBody>
       </p:sp>
@@ -4778,9 +3843,9 @@
           <a:p>
             <a:fld id="{A9DB9294-D83F-45CE-B910-2413C32C8D97}" type="datetimeFigureOut">
               <a:rPr lang="en-US" smtClean="0"/>
-              <a:t>4/27/2023</a:t>
+              <a:t>4/28/2023</a:t>
             </a:fld>
-            <a:endParaRPr lang="en-US"/>
+            <a:endParaRPr lang="en-US" dirty="0"/>
           </a:p>
         </p:txBody>
       </p:sp>
@@ -4805,7 +3870,7 @@
           <a:bodyPr/>
           <a:lstStyle/>
           <a:p>
-            <a:endParaRPr lang="en-US"/>
+            <a:endParaRPr lang="en-US" dirty="0"/>
           </a:p>
         </p:txBody>
       </p:sp>
@@ -4834,7 +3899,7 @@
               <a:rPr lang="en-US" smtClean="0"/>
               <a:t>‹#›</a:t>
             </a:fld>
-            <a:endParaRPr lang="en-US"/>
+            <a:endParaRPr lang="en-US" dirty="0"/>
           </a:p>
         </p:txBody>
       </p:sp>
@@ -4986,9 +4051,9 @@
           <a:p>
             <a:fld id="{A9DB9294-D83F-45CE-B910-2413C32C8D97}" type="datetimeFigureOut">
               <a:rPr lang="en-US" smtClean="0"/>
-              <a:t>4/27/2023</a:t>
+              <a:t>4/28/2023</a:t>
             </a:fld>
-            <a:endParaRPr lang="en-US"/>
+            <a:endParaRPr lang="en-US" dirty="0"/>
           </a:p>
         </p:txBody>
       </p:sp>
@@ -5013,7 +4078,7 @@
           <a:bodyPr/>
           <a:lstStyle/>
           <a:p>
-            <a:endParaRPr lang="en-US"/>
+            <a:endParaRPr lang="en-US" dirty="0"/>
           </a:p>
         </p:txBody>
       </p:sp>
@@ -5042,7 +4107,7 @@
               <a:rPr lang="en-US" smtClean="0"/>
               <a:t>‹#›</a:t>
             </a:fld>
-            <a:endParaRPr lang="en-US"/>
+            <a:endParaRPr lang="en-US" dirty="0"/>
           </a:p>
         </p:txBody>
       </p:sp>
@@ -5190,7 +4255,7 @@
           <a:p>
             <a:fld id="{DD53FA19-08AB-4C19-9D76-707E30220FE1}" type="datetimeFigureOut">
               <a:rPr lang="en-AU" smtClean="0"/>
-              <a:t>27/04/2023</a:t>
+              <a:t>28/04/2023</a:t>
             </a:fld>
             <a:endParaRPr lang="en-AU" dirty="0"/>
           </a:p>
@@ -5360,7 +4425,7 @@
           <a:p>
             <a:fld id="{DD53FA19-08AB-4C19-9D76-707E30220FE1}" type="datetimeFigureOut">
               <a:rPr lang="en-AU" smtClean="0"/>
-              <a:t>27/04/2023</a:t>
+              <a:t>28/04/2023</a:t>
             </a:fld>
             <a:endParaRPr lang="en-AU" dirty="0"/>
           </a:p>
@@ -5604,7 +4669,7 @@
           <a:p>
             <a:fld id="{DD53FA19-08AB-4C19-9D76-707E30220FE1}" type="datetimeFigureOut">
               <a:rPr lang="en-AU" smtClean="0"/>
-              <a:t>27/04/2023</a:t>
+              <a:t>28/04/2023</a:t>
             </a:fld>
             <a:endParaRPr lang="en-AU" dirty="0"/>
           </a:p>
@@ -5836,7 +4901,7 @@
           <a:p>
             <a:fld id="{DD53FA19-08AB-4C19-9D76-707E30220FE1}" type="datetimeFigureOut">
               <a:rPr lang="en-AU" smtClean="0"/>
-              <a:t>27/04/2023</a:t>
+              <a:t>28/04/2023</a:t>
             </a:fld>
             <a:endParaRPr lang="en-AU" dirty="0"/>
           </a:p>
@@ -6203,7 +5268,7 @@
           <a:p>
             <a:fld id="{DD53FA19-08AB-4C19-9D76-707E30220FE1}" type="datetimeFigureOut">
               <a:rPr lang="en-AU" smtClean="0"/>
-              <a:t>27/04/2023</a:t>
+              <a:t>28/04/2023</a:t>
             </a:fld>
             <a:endParaRPr lang="en-AU" dirty="0"/>
           </a:p>
@@ -6321,7 +5386,7 @@
           <a:p>
             <a:fld id="{DD53FA19-08AB-4C19-9D76-707E30220FE1}" type="datetimeFigureOut">
               <a:rPr lang="en-AU" smtClean="0"/>
-              <a:t>27/04/2023</a:t>
+              <a:t>28/04/2023</a:t>
             </a:fld>
             <a:endParaRPr lang="en-AU" dirty="0"/>
           </a:p>
@@ -6416,7 +5481,7 @@
           <a:p>
             <a:fld id="{DD53FA19-08AB-4C19-9D76-707E30220FE1}" type="datetimeFigureOut">
               <a:rPr lang="en-AU" smtClean="0"/>
-              <a:t>27/04/2023</a:t>
+              <a:t>28/04/2023</a:t>
             </a:fld>
             <a:endParaRPr lang="en-AU" dirty="0"/>
           </a:p>
@@ -6693,7 +5758,7 @@
           <a:p>
             <a:fld id="{DD53FA19-08AB-4C19-9D76-707E30220FE1}" type="datetimeFigureOut">
               <a:rPr lang="en-AU" smtClean="0"/>
-              <a:t>27/04/2023</a:t>
+              <a:t>28/04/2023</a:t>
             </a:fld>
             <a:endParaRPr lang="en-AU" dirty="0"/>
           </a:p>
@@ -6879,9 +5944,9 @@
           <a:p>
             <a:fld id="{A9DB9294-D83F-45CE-B910-2413C32C8D97}" type="datetimeFigureOut">
               <a:rPr lang="en-US" smtClean="0"/>
-              <a:t>4/27/2023</a:t>
+              <a:t>4/28/2023</a:t>
             </a:fld>
-            <a:endParaRPr lang="en-US"/>
+            <a:endParaRPr lang="en-US" dirty="0"/>
           </a:p>
         </p:txBody>
       </p:sp>
@@ -6906,7 +5971,7 @@
           <a:bodyPr/>
           <a:lstStyle/>
           <a:p>
-            <a:endParaRPr lang="en-US"/>
+            <a:endParaRPr lang="en-US" dirty="0"/>
           </a:p>
         </p:txBody>
       </p:sp>
@@ -6935,7 +6000,7 @@
               <a:rPr lang="en-US" smtClean="0"/>
               <a:t>‹#›</a:t>
             </a:fld>
-            <a:endParaRPr lang="en-US"/>
+            <a:endParaRPr lang="en-US" dirty="0"/>
           </a:p>
         </p:txBody>
       </p:sp>
@@ -7147,7 +6212,7 @@
           <a:p>
             <a:fld id="{DD53FA19-08AB-4C19-9D76-707E30220FE1}" type="datetimeFigureOut">
               <a:rPr lang="en-AU" smtClean="0"/>
-              <a:t>27/04/2023</a:t>
+              <a:t>28/04/2023</a:t>
             </a:fld>
             <a:endParaRPr lang="en-AU" dirty="0"/>
           </a:p>
@@ -7317,7 +6382,7 @@
           <a:p>
             <a:fld id="{DD53FA19-08AB-4C19-9D76-707E30220FE1}" type="datetimeFigureOut">
               <a:rPr lang="en-AU" smtClean="0"/>
-              <a:t>27/04/2023</a:t>
+              <a:t>28/04/2023</a:t>
             </a:fld>
             <a:endParaRPr lang="en-AU" dirty="0"/>
           </a:p>
@@ -7497,7 +6562,7 @@
           <a:p>
             <a:fld id="{DD53FA19-08AB-4C19-9D76-707E30220FE1}" type="datetimeFigureOut">
               <a:rPr lang="en-AU" smtClean="0"/>
-              <a:t>27/04/2023</a:t>
+              <a:t>28/04/2023</a:t>
             </a:fld>
             <a:endParaRPr lang="en-AU" dirty="0"/>
           </a:p>
@@ -7760,9 +6825,9 @@
           <a:p>
             <a:fld id="{A9DB9294-D83F-45CE-B910-2413C32C8D97}" type="datetimeFigureOut">
               <a:rPr lang="en-US" smtClean="0"/>
-              <a:t>4/27/2023</a:t>
+              <a:t>4/28/2023</a:t>
             </a:fld>
-            <a:endParaRPr lang="en-US"/>
+            <a:endParaRPr lang="en-US" dirty="0"/>
           </a:p>
         </p:txBody>
       </p:sp>
@@ -7787,7 +6852,7 @@
           <a:bodyPr/>
           <a:lstStyle/>
           <a:p>
-            <a:endParaRPr lang="en-US"/>
+            <a:endParaRPr lang="en-US" dirty="0"/>
           </a:p>
         </p:txBody>
       </p:sp>
@@ -7816,7 +6881,7 @@
               <a:rPr lang="en-US" smtClean="0"/>
               <a:t>‹#›</a:t>
             </a:fld>
-            <a:endParaRPr lang="en-US"/>
+            <a:endParaRPr lang="en-US" dirty="0"/>
           </a:p>
         </p:txBody>
       </p:sp>
@@ -8025,9 +7090,9 @@
           <a:p>
             <a:fld id="{A9DB9294-D83F-45CE-B910-2413C32C8D97}" type="datetimeFigureOut">
               <a:rPr lang="en-US" smtClean="0"/>
-              <a:t>4/27/2023</a:t>
+              <a:t>4/28/2023</a:t>
             </a:fld>
-            <a:endParaRPr lang="en-US"/>
+            <a:endParaRPr lang="en-US" dirty="0"/>
           </a:p>
         </p:txBody>
       </p:sp>
@@ -8052,7 +7117,7 @@
           <a:bodyPr/>
           <a:lstStyle/>
           <a:p>
-            <a:endParaRPr lang="en-US"/>
+            <a:endParaRPr lang="en-US" dirty="0"/>
           </a:p>
         </p:txBody>
       </p:sp>
@@ -8081,7 +7146,7 @@
               <a:rPr lang="en-US" smtClean="0"/>
               <a:t>‹#›</a:t>
             </a:fld>
-            <a:endParaRPr lang="en-US"/>
+            <a:endParaRPr lang="en-US" dirty="0"/>
           </a:p>
         </p:txBody>
       </p:sp>
@@ -8437,9 +7502,9 @@
           <a:p>
             <a:fld id="{A9DB9294-D83F-45CE-B910-2413C32C8D97}" type="datetimeFigureOut">
               <a:rPr lang="en-US" smtClean="0"/>
-              <a:t>4/27/2023</a:t>
+              <a:t>4/28/2023</a:t>
             </a:fld>
-            <a:endParaRPr lang="en-US"/>
+            <a:endParaRPr lang="en-US" dirty="0"/>
           </a:p>
         </p:txBody>
       </p:sp>
@@ -8464,7 +7529,7 @@
           <a:bodyPr/>
           <a:lstStyle/>
           <a:p>
-            <a:endParaRPr lang="en-US"/>
+            <a:endParaRPr lang="en-US" dirty="0"/>
           </a:p>
         </p:txBody>
       </p:sp>
@@ -8493,7 +7558,7 @@
               <a:rPr lang="en-US" smtClean="0"/>
               <a:t>‹#›</a:t>
             </a:fld>
-            <a:endParaRPr lang="en-US"/>
+            <a:endParaRPr lang="en-US" dirty="0"/>
           </a:p>
         </p:txBody>
       </p:sp>
@@ -8578,9 +7643,9 @@
           <a:p>
             <a:fld id="{A9DB9294-D83F-45CE-B910-2413C32C8D97}" type="datetimeFigureOut">
               <a:rPr lang="en-US" smtClean="0"/>
-              <a:t>4/27/2023</a:t>
+              <a:t>4/28/2023</a:t>
             </a:fld>
-            <a:endParaRPr lang="en-US"/>
+            <a:endParaRPr lang="en-US" dirty="0"/>
           </a:p>
         </p:txBody>
       </p:sp>
@@ -8605,7 +7670,7 @@
           <a:bodyPr/>
           <a:lstStyle/>
           <a:p>
-            <a:endParaRPr lang="en-US"/>
+            <a:endParaRPr lang="en-US" dirty="0"/>
           </a:p>
         </p:txBody>
       </p:sp>
@@ -8634,7 +7699,7 @@
               <a:rPr lang="en-US" smtClean="0"/>
               <a:t>‹#›</a:t>
             </a:fld>
-            <a:endParaRPr lang="en-US"/>
+            <a:endParaRPr lang="en-US" dirty="0"/>
           </a:p>
         </p:txBody>
       </p:sp>
@@ -8691,9 +7756,9 @@
           <a:p>
             <a:fld id="{A9DB9294-D83F-45CE-B910-2413C32C8D97}" type="datetimeFigureOut">
               <a:rPr lang="en-US" smtClean="0"/>
-              <a:t>4/27/2023</a:t>
+              <a:t>4/28/2023</a:t>
             </a:fld>
-            <a:endParaRPr lang="en-US"/>
+            <a:endParaRPr lang="en-US" dirty="0"/>
           </a:p>
         </p:txBody>
       </p:sp>
@@ -8718,7 +7783,7 @@
           <a:bodyPr/>
           <a:lstStyle/>
           <a:p>
-            <a:endParaRPr lang="en-US"/>
+            <a:endParaRPr lang="en-US" dirty="0"/>
           </a:p>
         </p:txBody>
       </p:sp>
@@ -8747,7 +7812,7 @@
               <a:rPr lang="en-US" smtClean="0"/>
               <a:t>‹#›</a:t>
             </a:fld>
-            <a:endParaRPr lang="en-US"/>
+            <a:endParaRPr lang="en-US" dirty="0"/>
           </a:p>
         </p:txBody>
       </p:sp>
@@ -9002,9 +8067,9 @@
           <a:p>
             <a:fld id="{A9DB9294-D83F-45CE-B910-2413C32C8D97}" type="datetimeFigureOut">
               <a:rPr lang="en-US" smtClean="0"/>
-              <a:t>4/27/2023</a:t>
+              <a:t>4/28/2023</a:t>
             </a:fld>
-            <a:endParaRPr lang="en-US"/>
+            <a:endParaRPr lang="en-US" dirty="0"/>
           </a:p>
         </p:txBody>
       </p:sp>
@@ -9029,7 +8094,7 @@
           <a:bodyPr/>
           <a:lstStyle/>
           <a:p>
-            <a:endParaRPr lang="en-US"/>
+            <a:endParaRPr lang="en-US" dirty="0"/>
           </a:p>
         </p:txBody>
       </p:sp>
@@ -9058,7 +8123,7 @@
               <a:rPr lang="en-US" smtClean="0"/>
               <a:t>‹#›</a:t>
             </a:fld>
-            <a:endParaRPr lang="en-US"/>
+            <a:endParaRPr lang="en-US" dirty="0"/>
           </a:p>
         </p:txBody>
       </p:sp>
@@ -9192,7 +8257,7 @@
             </a:lvl9pPr>
           </a:lstStyle>
           <a:p>
-            <a:endParaRPr lang="en-US"/>
+            <a:endParaRPr lang="en-US" dirty="0"/>
           </a:p>
         </p:txBody>
       </p:sp>
@@ -9290,9 +8355,9 @@
           <a:p>
             <a:fld id="{A9DB9294-D83F-45CE-B910-2413C32C8D97}" type="datetimeFigureOut">
               <a:rPr lang="en-US" smtClean="0"/>
-              <a:t>4/27/2023</a:t>
+              <a:t>4/28/2023</a:t>
             </a:fld>
-            <a:endParaRPr lang="en-US"/>
+            <a:endParaRPr lang="en-US" dirty="0"/>
           </a:p>
         </p:txBody>
       </p:sp>
@@ -9317,7 +8382,7 @@
           <a:bodyPr/>
           <a:lstStyle/>
           <a:p>
-            <a:endParaRPr lang="en-US"/>
+            <a:endParaRPr lang="en-US" dirty="0"/>
           </a:p>
         </p:txBody>
       </p:sp>
@@ -9346,7 +8411,7 @@
               <a:rPr lang="en-US" smtClean="0"/>
               <a:t>‹#›</a:t>
             </a:fld>
-            <a:endParaRPr lang="en-US"/>
+            <a:endParaRPr lang="en-US" dirty="0"/>
           </a:p>
         </p:txBody>
       </p:sp>
@@ -9531,9 +8596,9 @@
           <a:p>
             <a:fld id="{A9DB9294-D83F-45CE-B910-2413C32C8D97}" type="datetimeFigureOut">
               <a:rPr lang="en-US" smtClean="0"/>
-              <a:t>4/27/2023</a:t>
+              <a:t>4/28/2023</a:t>
             </a:fld>
-            <a:endParaRPr lang="en-US"/>
+            <a:endParaRPr lang="en-US" dirty="0"/>
           </a:p>
         </p:txBody>
       </p:sp>
@@ -9576,7 +8641,7 @@
             </a:lvl1pPr>
           </a:lstStyle>
           <a:p>
-            <a:endParaRPr lang="en-US"/>
+            <a:endParaRPr lang="en-US" dirty="0"/>
           </a:p>
         </p:txBody>
       </p:sp>
@@ -9623,7 +8688,7 @@
               <a:rPr lang="en-US" smtClean="0"/>
               <a:t>‹#›</a:t>
             </a:fld>
-            <a:endParaRPr lang="en-US"/>
+            <a:endParaRPr lang="en-US" dirty="0"/>
           </a:p>
         </p:txBody>
       </p:sp>
@@ -10083,7 +9148,7 @@
           <a:p>
             <a:fld id="{DD53FA19-08AB-4C19-9D76-707E30220FE1}" type="datetimeFigureOut">
               <a:rPr lang="en-AU" smtClean="0"/>
-              <a:t>27/04/2023</a:t>
+              <a:t>28/04/2023</a:t>
             </a:fld>
             <a:endParaRPr lang="en-AU" dirty="0"/>
           </a:p>
@@ -10548,7 +9613,7 @@
           </a:lstStyle>
           <a:p>
             <a:r>
-              <a:rPr lang="en-US" sz="9600" i="1" spc="100">
+              <a:rPr lang="en-US" sz="9600" i="1" spc="100" dirty="0">
                 <a:solidFill>
                   <a:schemeClr val="tx1">
                     <a:lumMod val="85000"/>
@@ -10561,7 +9626,7 @@
               <a:t>DietR</a:t>
             </a:r>
             <a:r>
-              <a:rPr lang="en-US" sz="8800">
+              <a:rPr lang="en-US" sz="8800" dirty="0">
                 <a:solidFill>
                   <a:schemeClr val="tx1">
                     <a:lumMod val="85000"/>
@@ -10574,7 +9639,7 @@
               <a:t> </a:t>
             </a:r>
             <a:r>
-              <a:rPr lang="en-US" sz="8800">
+              <a:rPr lang="en-US" sz="8800" dirty="0">
                 <a:solidFill>
                   <a:schemeClr val="tx1">
                     <a:lumMod val="85000"/>
@@ -10589,7 +9654,7 @@
           </a:p>
           <a:p>
             <a:r>
-              <a:rPr lang="en-US" sz="8200">
+              <a:rPr lang="en-US" sz="8200" dirty="0">
                 <a:solidFill>
                   <a:schemeClr val="tx1">
                     <a:lumMod val="85000"/>
@@ -10601,16 +9666,6 @@
               </a:rPr>
               <a:t>A dietary analysis tool for ASA24 and NHANES in R</a:t>
             </a:r>
-            <a:endParaRPr lang="en-US" sz="8200" dirty="0">
-              <a:solidFill>
-                <a:schemeClr val="tx1">
-                  <a:lumMod val="85000"/>
-                  <a:lumOff val="15000"/>
-                </a:schemeClr>
-              </a:solidFill>
-              <a:latin typeface="Arial" panose="020B0604020202020204" pitchFamily="34" charset="0"/>
-              <a:cs typeface="Arial" panose="020B0604020202020204" pitchFamily="34" charset="0"/>
-            </a:endParaRPr>
           </a:p>
         </p:txBody>
       </p:sp>
@@ -10628,8 +9683,8 @@
         </p:nvSpPr>
         <p:spPr>
           <a:xfrm>
-            <a:off x="1041308" y="21532384"/>
-            <a:ext cx="19437328" cy="17786816"/>
+            <a:off x="800677" y="21532384"/>
+            <a:ext cx="19730993" cy="18080730"/>
           </a:xfrm>
           <a:prstGeom prst="rect">
             <a:avLst/>
@@ -10685,7 +9740,7 @@
         </p:nvSpPr>
         <p:spPr>
           <a:xfrm>
-            <a:off x="1466871" y="3433357"/>
+            <a:off x="980057" y="3400493"/>
             <a:ext cx="23125676" cy="1810002"/>
           </a:xfrm>
           <a:prstGeom prst="rect">
@@ -10815,7 +9870,7 @@
               <a:t>1 </a:t>
             </a:r>
             <a:r>
-              <a:rPr lang="en-US" sz="4800">
+              <a:rPr lang="en-US" sz="4800" dirty="0">
                 <a:solidFill>
                   <a:schemeClr val="tx1">
                     <a:lumMod val="50000"/>
@@ -10827,7 +9882,7 @@
               <a:t>, Abigail Johnson</a:t>
             </a:r>
             <a:r>
-              <a:rPr lang="en-US" sz="4800" baseline="30000">
+              <a:rPr lang="en-US" sz="4800" baseline="30000" dirty="0">
                 <a:solidFill>
                   <a:schemeClr val="tx1">
                     <a:lumMod val="50000"/>
@@ -10850,7 +9905,7 @@
           </a:p>
           <a:p>
             <a:r>
-              <a:rPr lang="en-US" sz="4000" baseline="30000">
+              <a:rPr lang="en-US" sz="4000" baseline="30000" dirty="0">
                 <a:solidFill>
                   <a:schemeClr val="tx1">
                     <a:lumMod val="50000"/>
@@ -10862,7 +9917,7 @@
               <a:t>1</a:t>
             </a:r>
             <a:r>
-              <a:rPr lang="en-US" sz="4000">
+              <a:rPr lang="en-US" sz="4000" dirty="0">
                 <a:solidFill>
                   <a:schemeClr val="tx1">
                     <a:lumMod val="50000"/>
@@ -10874,7 +9929,7 @@
               <a:t>Kyoto-city, Kyoto, Japan </a:t>
             </a:r>
             <a:r>
-              <a:rPr lang="en-US" sz="4000" baseline="30000">
+              <a:rPr lang="en-US" sz="4000" baseline="30000" dirty="0">
                 <a:solidFill>
                   <a:schemeClr val="tx1">
                     <a:lumMod val="50000"/>
@@ -10886,7 +9941,7 @@
               <a:t>2</a:t>
             </a:r>
             <a:r>
-              <a:rPr lang="en-US" sz="4000">
+              <a:rPr lang="en-US" sz="4000" dirty="0">
                 <a:solidFill>
                   <a:schemeClr val="tx1">
                     <a:lumMod val="50000"/>
@@ -10914,7 +9969,7 @@
         </p:nvSpPr>
         <p:spPr>
           <a:xfrm>
-            <a:off x="1369605" y="21670302"/>
+            <a:off x="1128975" y="21702959"/>
             <a:ext cx="19070931" cy="707886"/>
           </a:xfrm>
           <a:prstGeom prst="rect">
@@ -10929,22 +9984,15 @@
           <a:lstStyle/>
           <a:p>
             <a:r>
-              <a:rPr lang="en-GB" sz="3900" b="1">
+              <a:rPr lang="en-GB" sz="3900" b="1" dirty="0">
                 <a:solidFill>
-                  <a:srgbClr val="006600"/>
+                  <a:srgbClr val="1F3600"/>
                 </a:solidFill>
                 <a:latin typeface="Consolas" panose="020B0609020204030204" pitchFamily="49" charset="0"/>
                 <a:cs typeface="Aharoni" panose="02010803020104030203" pitchFamily="2" charset="-79"/>
               </a:rPr>
               <a:t>Case study: nuts/seeds/legumes consumption diversity &amp; body measures</a:t>
             </a:r>
-            <a:endParaRPr lang="en-GB" sz="3900" b="1" dirty="0">
-              <a:solidFill>
-                <a:srgbClr val="006600"/>
-              </a:solidFill>
-              <a:latin typeface="Consolas" panose="020B0609020204030204" pitchFamily="49" charset="0"/>
-              <a:cs typeface="Aharoni" panose="02010803020104030203" pitchFamily="2" charset="-79"/>
-            </a:endParaRPr>
           </a:p>
         </p:txBody>
       </p:sp>
@@ -10963,7 +10011,7 @@
         <p:spPr>
           <a:xfrm>
             <a:off x="20845033" y="21528115"/>
-            <a:ext cx="8477209" cy="6560684"/>
+            <a:ext cx="8807653" cy="6034514"/>
           </a:xfrm>
           <a:prstGeom prst="rect">
             <a:avLst/>
@@ -10995,7 +10043,7 @@
           <a:bodyPr rtlCol="0" anchor="ctr"/>
           <a:lstStyle/>
           <a:p>
-            <a:endParaRPr lang="en-AU" sz="1800">
+            <a:endParaRPr lang="en-AU" sz="1800" dirty="0">
               <a:solidFill>
                 <a:schemeClr val="tx1">
                   <a:lumMod val="85000"/>
@@ -11022,7 +10070,7 @@
         </p:nvSpPr>
         <p:spPr>
           <a:xfrm>
-            <a:off x="21202990" y="21703027"/>
+            <a:off x="21029908" y="21703196"/>
             <a:ext cx="6822977" cy="707886"/>
           </a:xfrm>
           <a:prstGeom prst="rect">
@@ -11037,22 +10085,15 @@
           <a:lstStyle/>
           <a:p>
             <a:r>
-              <a:rPr lang="en-GB" sz="4000" b="1">
+              <a:rPr lang="en-GB" sz="4000" b="1" dirty="0">
                 <a:solidFill>
-                  <a:srgbClr val="006600"/>
+                  <a:srgbClr val="1F3600"/>
                 </a:solidFill>
                 <a:latin typeface="Consolas" panose="020B0609020204030204" pitchFamily="49" charset="0"/>
                 <a:cs typeface="Arial" panose="020B0604020202020204" pitchFamily="34" charset="0"/>
               </a:rPr>
               <a:t>Availability</a:t>
             </a:r>
-            <a:endParaRPr lang="en-GB" sz="4000" b="1" dirty="0">
-              <a:solidFill>
-                <a:srgbClr val="006600"/>
-              </a:solidFill>
-              <a:latin typeface="Consolas" panose="020B0609020204030204" pitchFamily="49" charset="0"/>
-              <a:cs typeface="Arial" panose="020B0604020202020204" pitchFamily="34" charset="0"/>
-            </a:endParaRPr>
           </a:p>
         </p:txBody>
       </p:sp>
@@ -11071,7 +10112,7 @@
         <p:spPr>
           <a:xfrm>
             <a:off x="11432426" y="5593196"/>
-            <a:ext cx="17931706" cy="6754269"/>
+            <a:ext cx="18220260" cy="6754269"/>
           </a:xfrm>
           <a:prstGeom prst="rect">
             <a:avLst/>
@@ -11125,7 +10166,7 @@
         </p:nvSpPr>
         <p:spPr>
           <a:xfrm>
-            <a:off x="11780995" y="5787223"/>
+            <a:off x="11780995" y="5756930"/>
             <a:ext cx="7586840" cy="707886"/>
           </a:xfrm>
           <a:prstGeom prst="rect">
@@ -11140,22 +10181,15 @@
           <a:lstStyle/>
           <a:p>
             <a:r>
-              <a:rPr lang="en-GB" sz="4000" b="1">
+              <a:rPr lang="en-GB" sz="4000" b="1" dirty="0">
                 <a:solidFill>
-                  <a:srgbClr val="006600"/>
+                  <a:srgbClr val="1F3600"/>
                 </a:solidFill>
                 <a:latin typeface="Consolas" panose="020B0609020204030204" pitchFamily="49" charset="0"/>
                 <a:cs typeface="Aharoni" panose="02010803020104030203" pitchFamily="2" charset="-79"/>
               </a:rPr>
               <a:t>Functionality</a:t>
             </a:r>
-            <a:endParaRPr lang="en-GB" sz="4000" b="1" dirty="0">
-              <a:solidFill>
-                <a:srgbClr val="006600"/>
-              </a:solidFill>
-              <a:latin typeface="Consolas" panose="020B0609020204030204" pitchFamily="49" charset="0"/>
-              <a:cs typeface="Aharoni" panose="02010803020104030203" pitchFamily="2" charset="-79"/>
-            </a:endParaRPr>
           </a:p>
         </p:txBody>
       </p:sp>
@@ -11173,8 +10207,8 @@
         </p:nvSpPr>
         <p:spPr>
           <a:xfrm>
-            <a:off x="1041308" y="5593196"/>
-            <a:ext cx="10018830" cy="6754269"/>
+            <a:off x="794788" y="5593196"/>
+            <a:ext cx="10265350" cy="6754269"/>
           </a:xfrm>
           <a:prstGeom prst="rect">
             <a:avLst/>
@@ -11228,7 +10262,7 @@
         </p:nvSpPr>
         <p:spPr>
           <a:xfrm>
-            <a:off x="1413596" y="5787223"/>
+            <a:off x="1220224" y="5753816"/>
             <a:ext cx="9252000" cy="707886"/>
           </a:xfrm>
           <a:prstGeom prst="rect">
@@ -11243,22 +10277,15 @@
           <a:lstStyle/>
           <a:p>
             <a:r>
-              <a:rPr lang="en-GB" sz="4000" b="1">
+              <a:rPr lang="en-GB" sz="4000" b="1" dirty="0">
                 <a:solidFill>
-                  <a:srgbClr val="006600"/>
+                  <a:srgbClr val="1F3600"/>
                 </a:solidFill>
                 <a:latin typeface="Consolas" panose="020B0609020204030204" pitchFamily="49" charset="0"/>
                 <a:cs typeface="Aharoni" panose="02010803020104030203" pitchFamily="2" charset="-79"/>
               </a:rPr>
               <a:t>Background</a:t>
             </a:r>
-            <a:endParaRPr lang="en-GB" sz="4000" b="1" dirty="0">
-              <a:solidFill>
-                <a:srgbClr val="006600"/>
-              </a:solidFill>
-              <a:latin typeface="Consolas" panose="020B0609020204030204" pitchFamily="49" charset="0"/>
-              <a:cs typeface="Aharoni" panose="02010803020104030203" pitchFamily="2" charset="-79"/>
-            </a:endParaRPr>
           </a:p>
         </p:txBody>
       </p:sp>
@@ -11276,8 +10303,8 @@
         </p:nvSpPr>
         <p:spPr>
           <a:xfrm>
-            <a:off x="1041308" y="12829487"/>
-            <a:ext cx="28322824" cy="8220875"/>
+            <a:off x="794788" y="12781361"/>
+            <a:ext cx="28857898" cy="8368789"/>
           </a:xfrm>
           <a:prstGeom prst="rect">
             <a:avLst/>
@@ -11331,8 +10358,8 @@
         </p:nvSpPr>
         <p:spPr>
           <a:xfrm>
-            <a:off x="1217928" y="6689136"/>
-            <a:ext cx="9687231" cy="4764381"/>
+            <a:off x="1328472" y="6689136"/>
+            <a:ext cx="9480435" cy="4764381"/>
           </a:xfrm>
           <a:prstGeom prst="rect">
             <a:avLst/>
@@ -11363,7 +10390,7 @@
               <a:buChar char="●"/>
             </a:pPr>
             <a:r>
-              <a:rPr lang="en-US" sz="3600">
+              <a:rPr lang="en-US" sz="3600" dirty="0">
                 <a:solidFill>
                   <a:schemeClr val="tx1">
                     <a:lumMod val="85000"/>
@@ -11390,7 +10417,7 @@
               <a:buChar char="●"/>
             </a:pPr>
             <a:r>
-              <a:rPr lang="en-US" sz="3600">
+              <a:rPr lang="en-US" sz="3600" dirty="0">
                 <a:solidFill>
                   <a:schemeClr val="tx1">
                     <a:lumMod val="85000"/>
@@ -11417,7 +10444,7 @@
               <a:buChar char="●"/>
             </a:pPr>
             <a:r>
-              <a:rPr lang="en-US" sz="3600">
+              <a:rPr lang="en-US" sz="3600" dirty="0">
                 <a:solidFill>
                   <a:schemeClr val="tx1">
                     <a:lumMod val="85000"/>
@@ -11429,16 +10456,6 @@
               </a:rPr>
               <a:t>We developed a package “DietR” to analyze NHANES and ASA24 data with R</a:t>
             </a:r>
-            <a:endParaRPr lang="en-US" sz="3600" dirty="0">
-              <a:solidFill>
-                <a:schemeClr val="tx1">
-                  <a:lumMod val="85000"/>
-                  <a:lumOff val="15000"/>
-                </a:schemeClr>
-              </a:solidFill>
-              <a:latin typeface="Arial" panose="020B0604020202020204" pitchFamily="34" charset="0"/>
-              <a:cs typeface="Arial" panose="020B0604020202020204" pitchFamily="34" charset="0"/>
-            </a:endParaRPr>
           </a:p>
         </p:txBody>
       </p:sp>
@@ -11456,7 +10473,7 @@
         </p:nvSpPr>
         <p:spPr>
           <a:xfrm>
-            <a:off x="1567304" y="25432693"/>
+            <a:off x="1326674" y="25563321"/>
             <a:ext cx="9064799" cy="3323987"/>
           </a:xfrm>
           <a:prstGeom prst="rect">
@@ -11481,7 +10498,7 @@
               <a:buChar char="•"/>
             </a:pPr>
             <a:r>
-              <a:rPr lang="en-US" sz="3000">
+              <a:rPr lang="en-US" sz="3000" dirty="0">
                 <a:solidFill>
                   <a:schemeClr val="tx1">
                     <a:lumMod val="85000"/>
@@ -11506,7 +10523,7 @@
               <a:buChar char="•"/>
             </a:pPr>
             <a:r>
-              <a:rPr lang="en-US" sz="3000">
+              <a:rPr lang="en-US" sz="3000" dirty="0">
                 <a:solidFill>
                   <a:schemeClr val="tx1">
                     <a:lumMod val="85000"/>
@@ -11531,7 +10548,7 @@
               <a:buChar char="•"/>
             </a:pPr>
             <a:r>
-              <a:rPr lang="en-US" sz="3000">
+              <a:rPr lang="en-US" sz="3000" dirty="0">
                 <a:solidFill>
                   <a:schemeClr val="tx1">
                     <a:lumMod val="85000"/>
@@ -11556,7 +10573,7 @@
               <a:buChar char="•"/>
             </a:pPr>
             <a:r>
-              <a:rPr lang="en-US" sz="3000">
+              <a:rPr lang="en-US" sz="3000" dirty="0">
                 <a:solidFill>
                   <a:schemeClr val="tx1">
                     <a:lumMod val="85000"/>
@@ -11569,7 +10586,7 @@
               <a:t>Analysis of covariance (ANCOVA) with </a:t>
             </a:r>
             <a:br>
-              <a:rPr lang="en-US" sz="3000">
+              <a:rPr lang="en-US" sz="3000" dirty="0">
                 <a:solidFill>
                   <a:schemeClr val="tx1">
                     <a:lumMod val="85000"/>
@@ -11581,7 +10598,7 @@
               </a:rPr>
             </a:br>
             <a:r>
-              <a:rPr lang="en-US" sz="3000">
+              <a:rPr lang="en-US" sz="3000" dirty="0">
                 <a:solidFill>
                   <a:schemeClr val="tx1">
                     <a:lumMod val="85000"/>
@@ -11593,16 +10610,6 @@
               </a:rPr>
               <a:t>Age + Gender + Fiber/1000kcal + PF_ALL</a:t>
             </a:r>
-            <a:endParaRPr lang="en-US" sz="3000" dirty="0">
-              <a:solidFill>
-                <a:schemeClr val="tx1">
-                  <a:lumMod val="85000"/>
-                  <a:lumOff val="15000"/>
-                </a:schemeClr>
-              </a:solidFill>
-              <a:latin typeface="Arial" panose="020B0604020202020204" pitchFamily="34" charset="0"/>
-              <a:cs typeface="Arial" panose="020B0604020202020204" pitchFamily="34" charset="0"/>
-            </a:endParaRPr>
           </a:p>
         </p:txBody>
       </p:sp>
@@ -11620,8 +10627,8 @@
         </p:nvSpPr>
         <p:spPr>
           <a:xfrm>
-            <a:off x="20845033" y="33811611"/>
-            <a:ext cx="8448873" cy="5507589"/>
+            <a:off x="20845033" y="34640404"/>
+            <a:ext cx="8807653" cy="4972710"/>
           </a:xfrm>
           <a:prstGeom prst="rect">
             <a:avLst/>
@@ -11675,7 +10682,7 @@
         </p:nvSpPr>
         <p:spPr>
           <a:xfrm>
-            <a:off x="21127369" y="33935567"/>
+            <a:off x="21029909" y="34786104"/>
             <a:ext cx="6822977" cy="707886"/>
           </a:xfrm>
           <a:prstGeom prst="rect">
@@ -11692,7 +10699,7 @@
             <a:r>
               <a:rPr lang="en-GB" sz="4000" b="1" dirty="0">
                 <a:solidFill>
-                  <a:srgbClr val="006600"/>
+                  <a:srgbClr val="1F3600"/>
                 </a:solidFill>
                 <a:latin typeface="Consolas" panose="020B0609020204030204" pitchFamily="49" charset="0"/>
                 <a:cs typeface="Arial" panose="020B0604020202020204" pitchFamily="34" charset="0"/>
@@ -11716,8 +10723,8 @@
         </p:nvSpPr>
         <p:spPr>
           <a:xfrm>
-            <a:off x="21157616" y="34697449"/>
-            <a:ext cx="7746974" cy="4247317"/>
+            <a:off x="21123298" y="35568542"/>
+            <a:ext cx="8103128" cy="3831818"/>
           </a:xfrm>
           <a:prstGeom prst="rect">
             <a:avLst/>
@@ -11732,7 +10739,7 @@
           <a:p>
             <a:pPr algn="just"/>
             <a:r>
-              <a:rPr lang="en-US" sz="2700">
+              <a:rPr lang="en-US" sz="2700" dirty="0">
                 <a:solidFill>
                   <a:schemeClr val="tx1">
                     <a:lumMod val="85000"/>
@@ -11745,7 +10752,7 @@
               <a:t>This project was supported by internal institutional start-up funds from the University of Minnesota. The authors would like to thank </a:t>
             </a:r>
             <a:r>
-              <a:rPr lang="en-US" sz="2700" u="sng">
+              <a:rPr lang="en-US" sz="2700" u="sng" dirty="0">
                 <a:solidFill>
                   <a:schemeClr val="tx1">
                     <a:lumMod val="85000"/>
@@ -11758,7 +10765,7 @@
               <a:t>Mo Hutti</a:t>
             </a:r>
             <a:r>
-              <a:rPr lang="en-US" sz="2700">
+              <a:rPr lang="en-US" sz="2700" dirty="0">
                 <a:solidFill>
                   <a:schemeClr val="tx1">
                     <a:lumMod val="85000"/>
@@ -11771,7 +10778,7 @@
               <a:t> for the create_corr_frame function which generates a correlation table with ordination axes and variables; </a:t>
             </a:r>
             <a:r>
-              <a:rPr lang="en-US" sz="2700" u="sng">
+              <a:rPr lang="en-US" sz="2700" u="sng" dirty="0">
                 <a:solidFill>
                   <a:schemeClr val="tx1">
                     <a:lumMod val="85000"/>
@@ -11784,7 +10791,7 @@
               <a:t>Pajau Vangay</a:t>
             </a:r>
             <a:r>
-              <a:rPr lang="en-US" sz="2700">
+              <a:rPr lang="en-US" sz="2700" dirty="0">
                 <a:solidFill>
                   <a:schemeClr val="tx1">
                     <a:lumMod val="85000"/>
@@ -11797,7 +10804,7 @@
               <a:t> for the collapse_by_correlation function which removes correlated variables; and </a:t>
             </a:r>
             <a:r>
-              <a:rPr lang="en-US" sz="2700" u="sng">
+              <a:rPr lang="en-US" sz="2700" u="sng" dirty="0">
                 <a:solidFill>
                   <a:schemeClr val="tx1">
                     <a:lumMod val="85000"/>
@@ -11810,7 +10817,7 @@
               <a:t>Suzie Hoops</a:t>
             </a:r>
             <a:r>
-              <a:rPr lang="en-US" sz="2700">
+              <a:rPr lang="en-US" sz="2700" dirty="0">
                 <a:solidFill>
                   <a:schemeClr val="tx1">
                     <a:lumMod val="85000"/>
@@ -11839,8 +10846,8 @@
         </p:nvSpPr>
         <p:spPr>
           <a:xfrm>
-            <a:off x="20845033" y="28561608"/>
-            <a:ext cx="8448873" cy="4774126"/>
+            <a:off x="20845033" y="27830441"/>
+            <a:ext cx="8807653" cy="6498116"/>
           </a:xfrm>
           <a:prstGeom prst="rect">
             <a:avLst/>
@@ -11894,7 +10901,7 @@
         </p:nvSpPr>
         <p:spPr>
           <a:xfrm>
-            <a:off x="21127369" y="28601834"/>
+            <a:off x="21029908" y="28048794"/>
             <a:ext cx="6822977" cy="707886"/>
           </a:xfrm>
           <a:prstGeom prst="rect">
@@ -11911,7 +10918,7 @@
             <a:r>
               <a:rPr lang="en-GB" sz="4000" b="1" dirty="0">
                 <a:solidFill>
-                  <a:srgbClr val="006600"/>
+                  <a:srgbClr val="1F3600"/>
                 </a:solidFill>
                 <a:latin typeface="Consolas" panose="020B0609020204030204" pitchFamily="49" charset="0"/>
                 <a:cs typeface="Arial" panose="020B0604020202020204" pitchFamily="34" charset="0"/>
@@ -11929,8 +10936,8 @@
         </p:nvSpPr>
         <p:spPr>
           <a:xfrm>
-            <a:off x="21168500" y="29327011"/>
-            <a:ext cx="7817655" cy="553998"/>
+            <a:off x="21183245" y="28756680"/>
+            <a:ext cx="7817655" cy="5324535"/>
           </a:xfrm>
           <a:prstGeom prst="rect">
             <a:avLst/>
@@ -11942,14 +10949,186 @@
           </a:bodyPr>
           <a:lstStyle/>
           <a:p>
-            <a:r>
-              <a:rPr lang="en-US" sz="3000" b="1">
+            <a:pPr algn="just">
+              <a:spcAft>
+                <a:spcPts val="600"/>
+              </a:spcAft>
+            </a:pPr>
+            <a:r>
+              <a:rPr lang="en-US" sz="2500" dirty="0">
+                <a:solidFill>
+                  <a:schemeClr val="tx1">
+                    <a:lumMod val="85000"/>
+                    <a:lumOff val="15000"/>
+                  </a:schemeClr>
+                </a:solidFill>
                 <a:latin typeface="Arial" panose="020B0604020202020204" pitchFamily="34" charset="0"/>
                 <a:cs typeface="Arial" panose="020B0604020202020204" pitchFamily="34" charset="0"/>
               </a:rPr>
-              <a:t>ref</a:t>
-            </a:r>
-            <a:endParaRPr lang="en-US" sz="3000" dirty="0">
+              <a:t>[1] Johnson AJ, Vangay P, Al-Ghalith GA, et al. Daily sampling reveals personalized diet-microbiome associations in humans. Cell Host Microbe. 2019;25(6</a:t>
+            </a:r>
+            <a:r>
+              <a:rPr lang="en-US" sz="2500">
+                <a:solidFill>
+                  <a:schemeClr val="tx1">
+                    <a:lumMod val="85000"/>
+                    <a:lumOff val="15000"/>
+                  </a:schemeClr>
+                </a:solidFill>
+                <a:latin typeface="Arial" panose="020B0604020202020204" pitchFamily="34" charset="0"/>
+                <a:cs typeface="Arial" panose="020B0604020202020204" pitchFamily="34" charset="0"/>
+              </a:rPr>
+              <a:t>):789-802.</a:t>
+            </a:r>
+            <a:endParaRPr lang="en-US" sz="2500" dirty="0">
+              <a:solidFill>
+                <a:schemeClr val="tx1">
+                  <a:lumMod val="85000"/>
+                  <a:lumOff val="15000"/>
+                </a:schemeClr>
+              </a:solidFill>
+              <a:latin typeface="Arial" panose="020B0604020202020204" pitchFamily="34" charset="0"/>
+              <a:cs typeface="Arial" panose="020B0604020202020204" pitchFamily="34" charset="0"/>
+            </a:endParaRPr>
+          </a:p>
+          <a:p>
+            <a:pPr algn="just">
+              <a:spcAft>
+                <a:spcPts val="600"/>
+              </a:spcAft>
+            </a:pPr>
+            <a:r>
+              <a:rPr lang="en-US" sz="2500" dirty="0">
+                <a:solidFill>
+                  <a:schemeClr val="tx1">
+                    <a:lumMod val="85000"/>
+                    <a:lumOff val="15000"/>
+                  </a:schemeClr>
+                </a:solidFill>
+                <a:latin typeface="Arial" panose="020B0604020202020204" pitchFamily="34" charset="0"/>
+                <a:cs typeface="Arial" panose="020B0604020202020204" pitchFamily="34" charset="0"/>
+              </a:rPr>
+              <a:t>[2]</a:t>
+            </a:r>
+            <a:r>
+              <a:rPr lang="fr-FR" sz="2500" dirty="0">
+                <a:solidFill>
+                  <a:schemeClr val="tx1">
+                    <a:lumMod val="85000"/>
+                    <a:lumOff val="15000"/>
+                  </a:schemeClr>
+                </a:solidFill>
+                <a:latin typeface="Arial" panose="020B0604020202020204" pitchFamily="34" charset="0"/>
+                <a:cs typeface="Arial" panose="020B0604020202020204" pitchFamily="34" charset="0"/>
+              </a:rPr>
+              <a:t> Simpson GL, Minchin PR, De Caceres M, et al. vegan: Community Ecology Package. 2022 </a:t>
+            </a:r>
+            <a:endParaRPr lang="en-US" sz="2500" dirty="0">
+              <a:solidFill>
+                <a:schemeClr val="tx1">
+                  <a:lumMod val="85000"/>
+                  <a:lumOff val="15000"/>
+                </a:schemeClr>
+              </a:solidFill>
+              <a:latin typeface="Arial" panose="020B0604020202020204" pitchFamily="34" charset="0"/>
+              <a:cs typeface="Arial" panose="020B0604020202020204" pitchFamily="34" charset="0"/>
+            </a:endParaRPr>
+          </a:p>
+          <a:p>
+            <a:pPr algn="just">
+              <a:spcAft>
+                <a:spcPts val="600"/>
+              </a:spcAft>
+            </a:pPr>
+            <a:r>
+              <a:rPr lang="en-US" sz="2500" dirty="0">
+                <a:solidFill>
+                  <a:schemeClr val="tx1">
+                    <a:lumMod val="85000"/>
+                    <a:lumOff val="15000"/>
+                  </a:schemeClr>
+                </a:solidFill>
+                <a:latin typeface="Arial" panose="020B0604020202020204" pitchFamily="34" charset="0"/>
+                <a:cs typeface="Arial" panose="020B0604020202020204" pitchFamily="34" charset="0"/>
+              </a:rPr>
+              <a:t>[3] </a:t>
+            </a:r>
+            <a:r>
+              <a:rPr lang="en-US" sz="2500" i="0" u="none" strike="noStrike" dirty="0">
+                <a:solidFill>
+                  <a:schemeClr val="tx1">
+                    <a:lumMod val="85000"/>
+                    <a:lumOff val="15000"/>
+                  </a:schemeClr>
+                </a:solidFill>
+                <a:effectLst/>
+                <a:latin typeface="Arial" panose="020B0604020202020204" pitchFamily="34" charset="0"/>
+              </a:rPr>
+              <a:t>Karlsen MC, Ellmore GS, McKeown N. Seeds—Health benefits, barriers to incorporation, and strategies for practitioners in supporting consumption among consumers. Nutr Today. 2016;51(1):50-59.</a:t>
+            </a:r>
+            <a:endParaRPr lang="en-US" sz="2500" dirty="0">
+              <a:solidFill>
+                <a:schemeClr val="tx1">
+                  <a:lumMod val="85000"/>
+                  <a:lumOff val="15000"/>
+                </a:schemeClr>
+              </a:solidFill>
+              <a:latin typeface="Arial" panose="020B0604020202020204" pitchFamily="34" charset="0"/>
+              <a:cs typeface="Arial" panose="020B0604020202020204" pitchFamily="34" charset="0"/>
+            </a:endParaRPr>
+          </a:p>
+          <a:p>
+            <a:pPr algn="just">
+              <a:spcAft>
+                <a:spcPts val="600"/>
+              </a:spcAft>
+            </a:pPr>
+            <a:r>
+              <a:rPr lang="en-US" sz="2500" dirty="0">
+                <a:solidFill>
+                  <a:schemeClr val="tx1">
+                    <a:lumMod val="85000"/>
+                    <a:lumOff val="15000"/>
+                  </a:schemeClr>
+                </a:solidFill>
+                <a:latin typeface="Arial" panose="020B0604020202020204" pitchFamily="34" charset="0"/>
+                <a:cs typeface="Arial" panose="020B0604020202020204" pitchFamily="34" charset="0"/>
+              </a:rPr>
+              <a:t>[4] </a:t>
+            </a:r>
+            <a:r>
+              <a:rPr lang="en-US" sz="2500" i="0" u="none" strike="noStrike" dirty="0">
+                <a:solidFill>
+                  <a:schemeClr val="tx1">
+                    <a:lumMod val="85000"/>
+                    <a:lumOff val="15000"/>
+                  </a:schemeClr>
+                </a:solidFill>
+                <a:effectLst/>
+                <a:latin typeface="Arial" panose="020B0604020202020204" pitchFamily="34" charset="0"/>
+              </a:rPr>
+              <a:t>Mitchell DC, Marinangeli CPF, Pigat S, et al. Pulse intake improves nutrient density among US adult consumers. Nutrients. 2021;13(8</a:t>
+            </a:r>
+            <a:r>
+              <a:rPr lang="en-US" sz="2500" i="0" u="none" strike="noStrike">
+                <a:solidFill>
+                  <a:schemeClr val="tx1">
+                    <a:lumMod val="85000"/>
+                    <a:lumOff val="15000"/>
+                  </a:schemeClr>
+                </a:solidFill>
+                <a:effectLst/>
+                <a:latin typeface="Arial" panose="020B0604020202020204" pitchFamily="34" charset="0"/>
+              </a:rPr>
+              <a:t>):2668.</a:t>
+            </a:r>
+            <a:endParaRPr lang="en-US" sz="2500" dirty="0">
+              <a:solidFill>
+                <a:schemeClr val="tx1">
+                  <a:lumMod val="85000"/>
+                  <a:lumOff val="15000"/>
+                </a:schemeClr>
+              </a:solidFill>
               <a:latin typeface="Arial" panose="020B0604020202020204" pitchFamily="34" charset="0"/>
               <a:cs typeface="Arial" panose="020B0604020202020204" pitchFamily="34" charset="0"/>
             </a:endParaRPr>
@@ -11970,8 +11149,8 @@
         </p:nvSpPr>
         <p:spPr>
           <a:xfrm>
-            <a:off x="1627637" y="23217692"/>
-            <a:ext cx="17734308" cy="1092607"/>
+            <a:off x="1392897" y="23350209"/>
+            <a:ext cx="17734308" cy="1054135"/>
           </a:xfrm>
           <a:prstGeom prst="rect">
             <a:avLst/>
@@ -11998,7 +11177,7 @@
               <a:buChar char="•"/>
             </a:pPr>
             <a:r>
-              <a:rPr lang="en-AU" sz="3000">
+              <a:rPr lang="en-AU" sz="3000" dirty="0">
                 <a:solidFill>
                   <a:schemeClr val="tx1">
                     <a:lumMod val="85000"/>
@@ -12008,7 +11187,7 @@
                 <a:latin typeface="Arial" panose="020B0604020202020204" pitchFamily="34" charset="0"/>
                 <a:cs typeface="Arial" panose="020B0604020202020204" pitchFamily="34" charset="0"/>
               </a:rPr>
-              <a:t>Previous studies suggest nuts/seeds/legumes have positive impacts on health</a:t>
+              <a:t>Previous studies suggest nuts/seeds/legumes have positive impacts on health [3].</a:t>
             </a:r>
           </a:p>
           <a:p>
@@ -12026,7 +11205,7 @@
               <a:buChar char="•"/>
             </a:pPr>
             <a:r>
-              <a:rPr lang="en-AU" sz="3000">
+              <a:rPr lang="en-AU" sz="3000" dirty="0">
                 <a:solidFill>
                   <a:schemeClr val="tx1">
                     <a:lumMod val="85000"/>
@@ -12036,18 +11215,8 @@
                 <a:latin typeface="Arial" panose="020B0604020202020204" pitchFamily="34" charset="0"/>
                 <a:cs typeface="Arial" panose="020B0604020202020204" pitchFamily="34" charset="0"/>
               </a:rPr>
-              <a:t>Does diversity of nuts/seeds/legumes consumption matter?</a:t>
-            </a:r>
-            <a:endParaRPr lang="en-AU" sz="3000" dirty="0">
-              <a:solidFill>
-                <a:schemeClr val="tx1">
-                  <a:lumMod val="85000"/>
-                  <a:lumOff val="15000"/>
-                </a:schemeClr>
-              </a:solidFill>
-              <a:latin typeface="Arial" panose="020B0604020202020204" pitchFamily="34" charset="0"/>
-              <a:cs typeface="Arial" panose="020B0604020202020204" pitchFamily="34" charset="0"/>
-            </a:endParaRPr>
+              <a:t>Is diversity of nuts/seeds/legumes consumption related to body measures, e.g. BMI or waist size?</a:t>
+            </a:r>
           </a:p>
         </p:txBody>
       </p:sp>
@@ -12082,7 +11251,7 @@
           <a:lstStyle/>
           <a:p>
             <a:r>
-              <a:rPr lang="en-AU" sz="3600">
+              <a:rPr lang="en-AU" sz="3600" dirty="0">
                 <a:solidFill>
                   <a:schemeClr val="tx1">
                     <a:lumMod val="85000"/>
@@ -12111,7 +11280,7 @@
         </p:nvSpPr>
         <p:spPr>
           <a:xfrm>
-            <a:off x="21765131" y="24420557"/>
+            <a:off x="21765131" y="24085822"/>
             <a:ext cx="7041487" cy="646331"/>
           </a:xfrm>
           <a:prstGeom prst="rect">
@@ -12128,7 +11297,7 @@
           <a:lstStyle/>
           <a:p>
             <a:r>
-              <a:rPr lang="en-AU" sz="3600">
+              <a:rPr lang="en-AU" sz="3600" dirty="0">
                 <a:solidFill>
                   <a:schemeClr val="tx1">
                     <a:lumMod val="85000"/>
@@ -12161,7 +11330,7 @@
         </p:nvSpPr>
         <p:spPr>
           <a:xfrm>
-            <a:off x="21292691" y="24489051"/>
+            <a:off x="21292691" y="24154316"/>
             <a:ext cx="396512" cy="531672"/>
           </a:xfrm>
           <a:prstGeom prst="rightArrow">
@@ -12308,13 +11477,13 @@
           <p:nvPr>
             <p:extLst>
               <p:ext uri="{D42A27DB-BD31-4B8C-83A1-F6EECF244321}">
-                <p14:modId xmlns:p14="http://schemas.microsoft.com/office/powerpoint/2010/main" val="3648878415"/>
+                <p14:modId xmlns:p14="http://schemas.microsoft.com/office/powerpoint/2010/main" val="3820390409"/>
               </p:ext>
             </p:extLst>
           </p:nvPr>
         </p:nvGraphicFramePr>
         <p:xfrm>
-          <a:off x="11902915" y="6681249"/>
+          <a:off x="12033543" y="6681249"/>
           <a:ext cx="16967357" cy="5218218"/>
         </p:xfrm>
         <a:graphic>
@@ -12363,7 +11532,7 @@
                         <a:defRPr/>
                       </a:pPr>
                       <a:r>
-                        <a:rPr lang="en-GB" sz="3000" b="1">
+                        <a:rPr lang="en-GB" sz="3000" b="1" dirty="0">
                           <a:solidFill>
                             <a:schemeClr val="accent6"/>
                           </a:solidFill>
@@ -12382,7 +11551,7 @@
                     <a:lstStyle/>
                     <a:p>
                       <a:r>
-                        <a:rPr lang="en-US" sz="3000">
+                        <a:rPr lang="en-US" sz="3000" dirty="0">
                           <a:solidFill>
                             <a:schemeClr val="tx1">
                               <a:lumMod val="85000"/>
@@ -12428,7 +11597,7 @@
                         <a:defRPr/>
                       </a:pPr>
                       <a:r>
-                        <a:rPr lang="en-GB" sz="3000" b="1">
+                        <a:rPr lang="en-GB" sz="3000" b="1" dirty="0">
                           <a:solidFill>
                             <a:schemeClr val="accent3">
                               <a:lumMod val="75000"/>
@@ -12449,7 +11618,7 @@
                     <a:lstStyle/>
                     <a:p>
                       <a:r>
-                        <a:rPr lang="en-AU" sz="3000">
+                        <a:rPr lang="en-AU" sz="3000" dirty="0">
                           <a:solidFill>
                             <a:schemeClr val="tx1">
                               <a:lumMod val="85000"/>
@@ -12461,7 +11630,7 @@
                         </a:rPr>
                         <a:t>Data summary, % KCAL by macronutrients in barcharts </a:t>
                       </a:r>
-                      <a:endParaRPr lang="en-US" sz="3000">
+                      <a:endParaRPr lang="en-US" sz="3000" dirty="0">
                         <a:solidFill>
                           <a:schemeClr val="tx1">
                             <a:lumMod val="85000"/>
@@ -12505,7 +11674,7 @@
                         <a:defRPr/>
                       </a:pPr>
                       <a:r>
-                        <a:rPr lang="en-GB" sz="3000" b="1">
+                        <a:rPr lang="en-GB" sz="3000" b="1" dirty="0">
                           <a:solidFill>
                             <a:schemeClr val="accent4">
                               <a:lumMod val="75000"/>
@@ -12526,7 +11695,7 @@
                     <a:lstStyle/>
                     <a:p>
                       <a:r>
-                        <a:rPr lang="en-AU" sz="3000">
+                        <a:rPr lang="en-AU" sz="3000" dirty="0">
                           <a:solidFill>
                             <a:schemeClr val="tx1">
                               <a:lumMod val="85000"/>
@@ -12536,9 +11705,9 @@
                           <a:latin typeface="Arial" panose="020B0604020202020204" pitchFamily="34" charset="0"/>
                           <a:cs typeface="Arial" panose="020B0604020202020204" pitchFamily="34" charset="0"/>
                         </a:rPr>
-                        <a:t>Compute diversity indeces of dietary records</a:t>
+                        <a:t>Compute diversity indices of dietary records</a:t>
                       </a:r>
-                      <a:endParaRPr lang="en-US" sz="3000" i="1">
+                      <a:endParaRPr lang="en-US" sz="3000" i="1" dirty="0">
                         <a:solidFill>
                           <a:schemeClr val="tx1">
                             <a:lumMod val="85000"/>
@@ -12582,7 +11751,7 @@
                         <a:defRPr/>
                       </a:pPr>
                       <a:r>
-                        <a:rPr lang="en-GB" sz="3000" b="1">
+                        <a:rPr lang="en-GB" sz="3000" b="1" dirty="0">
                           <a:solidFill>
                             <a:schemeClr val="accent2">
                               <a:lumMod val="75000"/>
@@ -12603,7 +11772,7 @@
                     <a:lstStyle/>
                     <a:p>
                       <a:r>
-                        <a:rPr lang="en-AU" sz="3000">
+                        <a:rPr lang="en-AU" sz="3000" dirty="0">
                           <a:solidFill>
                             <a:schemeClr val="tx1">
                               <a:lumMod val="85000"/>
@@ -12616,7 +11785,7 @@
                         <a:t>Principal component analysis (PCA), </a:t>
                       </a:r>
                       <a:r>
-                        <a:rPr lang="en-AU" sz="3000" i="1">
+                        <a:rPr lang="en-AU" sz="3000" i="1" dirty="0">
                           <a:solidFill>
                             <a:schemeClr val="tx1">
                               <a:lumMod val="85000"/>
@@ -12629,7 +11798,7 @@
                         <a:t>k-</a:t>
                       </a:r>
                       <a:r>
-                        <a:rPr lang="en-AU" sz="3000">
+                        <a:rPr lang="en-AU" sz="3000" dirty="0">
                           <a:solidFill>
                             <a:schemeClr val="tx1">
                               <a:lumMod val="85000"/>
@@ -12642,7 +11811,7 @@
                         <a:t>means, select the optimal </a:t>
                       </a:r>
                       <a:r>
-                        <a:rPr lang="en-AU" sz="3000" i="1">
+                        <a:rPr lang="en-AU" sz="3000" i="1" dirty="0">
                           <a:solidFill>
                             <a:schemeClr val="tx1">
                               <a:lumMod val="85000"/>
@@ -12654,7 +11823,7 @@
                         </a:rPr>
                         <a:t>k</a:t>
                       </a:r>
-                      <a:endParaRPr lang="en-US" sz="3000" i="1">
+                      <a:endParaRPr lang="en-US" sz="3000" i="1" dirty="0">
                         <a:solidFill>
                           <a:schemeClr val="tx1">
                             <a:lumMod val="85000"/>
@@ -12698,7 +11867,7 @@
                         <a:defRPr/>
                       </a:pPr>
                       <a:r>
-                        <a:rPr kumimoji="0" lang="en-GB" sz="3000" b="1" i="0" u="none" strike="noStrike" kern="1200" cap="none" spc="0" normalizeH="0" baseline="0" noProof="0">
+                        <a:rPr kumimoji="0" lang="en-GB" sz="3000" b="1" i="0" u="none" strike="noStrike" kern="1200" cap="none" spc="0" normalizeH="0" baseline="0" noProof="0" dirty="0">
                           <a:ln>
                             <a:noFill/>
                           </a:ln>
@@ -12726,7 +11895,7 @@
                     <a:lstStyle/>
                     <a:p>
                       <a:r>
-                        <a:rPr lang="en-AU" sz="3000">
+                        <a:rPr lang="en-AU" sz="3000" dirty="0">
                           <a:solidFill>
                             <a:schemeClr val="tx1">
                               <a:lumMod val="85000"/>
@@ -12736,9 +11905,9 @@
                           <a:latin typeface="Arial" panose="020B0604020202020204" pitchFamily="34" charset="0"/>
                           <a:cs typeface="Arial" panose="020B0604020202020204" pitchFamily="34" charset="0"/>
                         </a:rPr>
-                        <a:t>Build foodtrees (Johnson 2019 [ref]) where foods in FNDDS are hierarchically grouped, visualize foodtrees, generate food OTU table (“vegan” package [ref]).</a:t>
+                        <a:t>Build foodtrees [1] where foods in FNDDS are hierarchically grouped, visualize foodtrees, generate food OTU table (“vegan” package [2]).</a:t>
                       </a:r>
-                      <a:endParaRPr lang="en-US" sz="3000">
+                      <a:endParaRPr lang="en-US" sz="3000" dirty="0">
                         <a:solidFill>
                           <a:schemeClr val="tx1">
                             <a:lumMod val="85000"/>
@@ -12782,14 +11951,12 @@
                         <a:defRPr/>
                       </a:pPr>
                       <a:r>
-                        <a:rPr kumimoji="0" lang="en-GB" sz="3000" b="1" i="0" u="none" strike="noStrike" kern="1200" cap="none" spc="0" normalizeH="0" baseline="0" noProof="0">
+                        <a:rPr kumimoji="0" lang="en-GB" sz="3000" b="1" i="0" u="none" strike="noStrike" kern="1200" cap="none" spc="0" normalizeH="0" baseline="0" noProof="0" dirty="0">
                           <a:ln>
                             <a:noFill/>
                           </a:ln>
                           <a:solidFill>
-                            <a:schemeClr val="tx2">
-                              <a:lumMod val="75000"/>
-                            </a:schemeClr>
+                            <a:srgbClr val="6C2E9A"/>
                           </a:solidFill>
                           <a:effectLst/>
                           <a:uLnTx/>
@@ -12810,7 +11977,7 @@
                     <a:lstStyle/>
                     <a:p>
                       <a:r>
-                        <a:rPr lang="en-US" sz="3000">
+                        <a:rPr lang="en-US" sz="3000" dirty="0">
                           <a:solidFill>
                             <a:schemeClr val="tx1">
                               <a:lumMod val="85000"/>
@@ -12823,7 +11990,7 @@
                         <a:t>Principal Coordinate Analysis (PCoA) based on their food intake (foodtree, OTU table) with the similarity of foods taken into account </a:t>
                       </a:r>
                       <a:r>
-                        <a:rPr lang="en-AU" sz="3000">
+                        <a:rPr lang="en-AU" sz="3000" dirty="0">
                           <a:solidFill>
                             <a:schemeClr val="tx1">
                               <a:lumMod val="85000"/>
@@ -12833,9 +12000,9 @@
                           <a:latin typeface="Arial" panose="020B0604020202020204" pitchFamily="34" charset="0"/>
                           <a:cs typeface="Arial" panose="020B0604020202020204" pitchFamily="34" charset="0"/>
                         </a:rPr>
-                        <a:t>(“vegan” package).</a:t>
+                        <a:t>(“vegan” package [2]).</a:t>
                       </a:r>
-                      <a:endParaRPr lang="en-US" sz="3000">
+                      <a:endParaRPr lang="en-US" sz="3000" dirty="0">
                         <a:solidFill>
                           <a:schemeClr val="tx1">
                             <a:lumMod val="85000"/>
@@ -12874,13 +12041,13 @@
           <p:nvPr>
             <p:extLst>
               <p:ext uri="{D42A27DB-BD31-4B8C-83A1-F6EECF244321}">
-                <p14:modId xmlns:p14="http://schemas.microsoft.com/office/powerpoint/2010/main" val="2902206454"/>
+                <p14:modId xmlns:p14="http://schemas.microsoft.com/office/powerpoint/2010/main" val="871409176"/>
               </p:ext>
             </p:extLst>
           </p:nvPr>
         </p:nvGraphicFramePr>
         <p:xfrm>
-          <a:off x="10778997" y="25536546"/>
+          <a:off x="10538367" y="25667174"/>
           <a:ext cx="9064799" cy="3097204"/>
         </p:xfrm>
         <a:graphic>
@@ -12927,14 +12094,14 @@
                     <a:p>
                       <a:pPr algn="l" rtl="0" fontAlgn="ctr"/>
                       <a:r>
-                        <a:rPr lang="en-US" sz="3000" u="none" strike="noStrike">
+                        <a:rPr lang="en-US" sz="3000" u="none" strike="noStrike" dirty="0">
                           <a:effectLst/>
                           <a:latin typeface="Arial" panose="020B0604020202020204" pitchFamily="34" charset="0"/>
                           <a:cs typeface="Arial" panose="020B0604020202020204" pitchFamily="34" charset="0"/>
                         </a:rPr>
                         <a:t>DivGroup</a:t>
                       </a:r>
-                      <a:endParaRPr lang="en-US" sz="3000" b="0" i="0" u="none" strike="noStrike">
+                      <a:endParaRPr lang="en-US" sz="3000" b="0" i="0" u="none" strike="noStrike" dirty="0">
                         <a:solidFill>
                           <a:srgbClr val="000000"/>
                         </a:solidFill>
@@ -12960,14 +12127,14 @@
                     <a:p>
                       <a:pPr algn="ctr" fontAlgn="ctr"/>
                       <a:r>
-                        <a:rPr lang="en-US" sz="3000" u="none" strike="noStrike">
+                        <a:rPr lang="en-US" sz="3000" u="none" strike="noStrike" dirty="0">
                           <a:effectLst/>
                           <a:latin typeface="Arial" panose="020B0604020202020204" pitchFamily="34" charset="0"/>
                           <a:cs typeface="Arial" panose="020B0604020202020204" pitchFamily="34" charset="0"/>
                         </a:rPr>
                         <a:t>n</a:t>
                       </a:r>
-                      <a:endParaRPr lang="en-US" sz="3000" b="0" i="0" u="none" strike="noStrike">
+                      <a:endParaRPr lang="en-US" sz="3000" b="0" i="0" u="none" strike="noStrike" dirty="0">
                         <a:solidFill>
                           <a:srgbClr val="000000"/>
                         </a:solidFill>
@@ -12993,14 +12160,14 @@
                     <a:p>
                       <a:pPr algn="ctr" fontAlgn="ctr"/>
                       <a:r>
-                        <a:rPr lang="en-US" sz="3000" u="none" strike="noStrike">
+                        <a:rPr lang="en-US" sz="3000" u="none" strike="noStrike" dirty="0">
                           <a:effectLst/>
                           <a:latin typeface="Arial" panose="020B0604020202020204" pitchFamily="34" charset="0"/>
                           <a:cs typeface="Arial" panose="020B0604020202020204" pitchFamily="34" charset="0"/>
                         </a:rPr>
                         <a:t>nuts/seeds/legumes consumed</a:t>
                       </a:r>
-                      <a:endParaRPr lang="en-US" sz="3000" b="0" i="0" u="none" strike="noStrike">
+                      <a:endParaRPr lang="en-US" sz="3000" b="0" i="0" u="none" strike="noStrike" dirty="0">
                         <a:solidFill>
                           <a:srgbClr val="000000"/>
                         </a:solidFill>
@@ -13026,7 +12193,7 @@
                     <a:p>
                       <a:pPr algn="ctr" fontAlgn="ctr"/>
                       <a:r>
-                        <a:rPr lang="en-US" sz="3000" u="none" strike="noStrike">
+                        <a:rPr lang="en-US" sz="3000" u="none" strike="noStrike" dirty="0">
                           <a:effectLst/>
                           <a:latin typeface="Arial" panose="020B0604020202020204" pitchFamily="34" charset="0"/>
                           <a:cs typeface="Arial" panose="020B0604020202020204" pitchFamily="34" charset="0"/>
@@ -13037,14 +12204,14 @@
                     <a:p>
                       <a:pPr algn="ctr" fontAlgn="ctr"/>
                       <a:r>
-                        <a:rPr lang="en-US" sz="3000" u="none" strike="noStrike">
+                        <a:rPr lang="en-US" sz="3000" u="none" strike="noStrike" dirty="0">
                           <a:effectLst/>
                           <a:latin typeface="Arial" panose="020B0604020202020204" pitchFamily="34" charset="0"/>
                           <a:cs typeface="Arial" panose="020B0604020202020204" pitchFamily="34" charset="0"/>
                         </a:rPr>
                         <a:t>index</a:t>
                       </a:r>
-                      <a:endParaRPr lang="en-US" sz="3000" b="0" i="0" u="none" strike="noStrike">
+                      <a:endParaRPr lang="en-US" sz="3000" b="0" i="0" u="none" strike="noStrike" dirty="0">
                         <a:solidFill>
                           <a:srgbClr val="000000"/>
                         </a:solidFill>
@@ -13077,14 +12244,14 @@
                     <a:p>
                       <a:pPr algn="l" fontAlgn="ctr"/>
                       <a:r>
-                        <a:rPr lang="en-US" sz="3000" u="none" strike="noStrike">
+                        <a:rPr lang="en-US" sz="3000" u="none" strike="noStrike" dirty="0">
                           <a:effectLst/>
                           <a:latin typeface="Arial" panose="020B0604020202020204" pitchFamily="34" charset="0"/>
                           <a:cs typeface="Arial" panose="020B0604020202020204" pitchFamily="34" charset="0"/>
                         </a:rPr>
                         <a:t>DivNA</a:t>
                       </a:r>
-                      <a:endParaRPr lang="en-US" sz="3000" b="0" i="0" u="none" strike="noStrike">
+                      <a:endParaRPr lang="en-US" sz="3000" b="0" i="0" u="none" strike="noStrike" dirty="0">
                         <a:solidFill>
                           <a:srgbClr val="000000"/>
                         </a:solidFill>
@@ -13103,14 +12270,14 @@
                     <a:p>
                       <a:pPr algn="ctr" fontAlgn="ctr"/>
                       <a:r>
-                        <a:rPr lang="en-US" sz="3000" u="none" strike="noStrike">
+                        <a:rPr lang="en-US" sz="3000" u="none" strike="noStrike" dirty="0">
                           <a:effectLst/>
                           <a:latin typeface="Arial" panose="020B0604020202020204" pitchFamily="34" charset="0"/>
                           <a:cs typeface="Arial" panose="020B0604020202020204" pitchFamily="34" charset="0"/>
                         </a:rPr>
                         <a:t>2,012</a:t>
                       </a:r>
-                      <a:endParaRPr lang="en-US" sz="3000" b="0" i="0" u="none" strike="noStrike">
+                      <a:endParaRPr lang="en-US" sz="3000" b="0" i="0" u="none" strike="noStrike" dirty="0">
                         <a:solidFill>
                           <a:srgbClr val="000000"/>
                         </a:solidFill>
@@ -13129,14 +12296,14 @@
                     <a:p>
                       <a:pPr algn="ctr" fontAlgn="ctr"/>
                       <a:r>
-                        <a:rPr lang="en-US" sz="3000" u="none" strike="noStrike">
+                        <a:rPr lang="en-US" sz="3000" u="none" strike="noStrike" dirty="0">
                           <a:effectLst/>
                           <a:latin typeface="Arial" panose="020B0604020202020204" pitchFamily="34" charset="0"/>
                           <a:cs typeface="Arial" panose="020B0604020202020204" pitchFamily="34" charset="0"/>
                         </a:rPr>
                         <a:t>0</a:t>
                       </a:r>
-                      <a:endParaRPr lang="en-US" sz="3000" b="0" i="0" u="none" strike="noStrike">
+                      <a:endParaRPr lang="en-US" sz="3000" b="0" i="0" u="none" strike="noStrike" dirty="0">
                         <a:solidFill>
                           <a:srgbClr val="000000"/>
                         </a:solidFill>
@@ -13155,14 +12322,14 @@
                     <a:p>
                       <a:pPr algn="ctr" fontAlgn="ctr"/>
                       <a:r>
-                        <a:rPr lang="en-US" sz="3000" u="none" strike="noStrike">
+                        <a:rPr lang="en-US" sz="3000" u="none" strike="noStrike" dirty="0">
                           <a:effectLst/>
                           <a:latin typeface="Arial" panose="020B0604020202020204" pitchFamily="34" charset="0"/>
                           <a:cs typeface="Arial" panose="020B0604020202020204" pitchFamily="34" charset="0"/>
                         </a:rPr>
                         <a:t>NA</a:t>
                       </a:r>
-                      <a:endParaRPr lang="en-US" sz="3000" b="0" i="0" u="none" strike="noStrike">
+                      <a:endParaRPr lang="en-US" sz="3000" b="0" i="0" u="none" strike="noStrike" dirty="0">
                         <a:solidFill>
                           <a:srgbClr val="000000"/>
                         </a:solidFill>
@@ -13188,14 +12355,14 @@
                     <a:p>
                       <a:pPr algn="l" fontAlgn="ctr"/>
                       <a:r>
-                        <a:rPr lang="en-US" sz="3000" u="none" strike="noStrike">
+                        <a:rPr lang="en-US" sz="3000" u="none" strike="noStrike" dirty="0">
                           <a:effectLst/>
                           <a:latin typeface="Arial" panose="020B0604020202020204" pitchFamily="34" charset="0"/>
                           <a:cs typeface="Arial" panose="020B0604020202020204" pitchFamily="34" charset="0"/>
                         </a:rPr>
                         <a:t>Div0</a:t>
                       </a:r>
-                      <a:endParaRPr lang="en-US" sz="3000" b="0" i="0" u="none" strike="noStrike">
+                      <a:endParaRPr lang="en-US" sz="3000" b="0" i="0" u="none" strike="noStrike" dirty="0">
                         <a:solidFill>
                           <a:srgbClr val="000000"/>
                         </a:solidFill>
@@ -13214,14 +12381,14 @@
                     <a:p>
                       <a:pPr algn="ctr" fontAlgn="ctr"/>
                       <a:r>
-                        <a:rPr lang="en-US" sz="3000" u="none" strike="noStrike">
+                        <a:rPr lang="en-US" sz="3000" u="none" strike="noStrike" dirty="0">
                           <a:effectLst/>
                           <a:latin typeface="Arial" panose="020B0604020202020204" pitchFamily="34" charset="0"/>
                           <a:cs typeface="Arial" panose="020B0604020202020204" pitchFamily="34" charset="0"/>
                         </a:rPr>
                         <a:t>1,246</a:t>
                       </a:r>
-                      <a:endParaRPr lang="en-US" sz="3000" b="0" i="0" u="none" strike="noStrike">
+                      <a:endParaRPr lang="en-US" sz="3000" b="0" i="0" u="none" strike="noStrike" dirty="0">
                         <a:solidFill>
                           <a:srgbClr val="000000"/>
                         </a:solidFill>
@@ -13240,14 +12407,14 @@
                     <a:p>
                       <a:pPr algn="ctr" fontAlgn="ctr"/>
                       <a:r>
-                        <a:rPr lang="en-US" sz="3000" u="none" strike="noStrike">
+                        <a:rPr lang="en-US" sz="3000" u="none" strike="noStrike" dirty="0">
                           <a:effectLst/>
                           <a:latin typeface="Arial" panose="020B0604020202020204" pitchFamily="34" charset="0"/>
                           <a:cs typeface="Arial" panose="020B0604020202020204" pitchFamily="34" charset="0"/>
                         </a:rPr>
                         <a:t>1</a:t>
                       </a:r>
-                      <a:endParaRPr lang="en-US" sz="3000" b="0" i="0" u="none" strike="noStrike">
+                      <a:endParaRPr lang="en-US" sz="3000" b="0" i="0" u="none" strike="noStrike" dirty="0">
                         <a:solidFill>
                           <a:srgbClr val="000000"/>
                         </a:solidFill>
@@ -13266,14 +12433,14 @@
                     <a:p>
                       <a:pPr algn="ctr" fontAlgn="ctr"/>
                       <a:r>
-                        <a:rPr lang="en-US" sz="3000" u="none" strike="noStrike">
+                        <a:rPr lang="en-US" sz="3000" u="none" strike="noStrike" dirty="0">
                           <a:effectLst/>
                           <a:latin typeface="Arial" panose="020B0604020202020204" pitchFamily="34" charset="0"/>
                           <a:cs typeface="Arial" panose="020B0604020202020204" pitchFamily="34" charset="0"/>
                         </a:rPr>
                         <a:t>0</a:t>
                       </a:r>
-                      <a:endParaRPr lang="en-US" sz="3000" b="0" i="0" u="none" strike="noStrike">
+                      <a:endParaRPr lang="en-US" sz="3000" b="0" i="0" u="none" strike="noStrike" dirty="0">
                         <a:solidFill>
                           <a:srgbClr val="000000"/>
                         </a:solidFill>
@@ -13299,14 +12466,14 @@
                     <a:p>
                       <a:pPr algn="l" fontAlgn="ctr"/>
                       <a:r>
-                        <a:rPr lang="en-US" sz="3000" u="none" strike="noStrike">
+                        <a:rPr lang="en-US" sz="3000" u="none" strike="noStrike" dirty="0">
                           <a:effectLst/>
                           <a:latin typeface="Arial" panose="020B0604020202020204" pitchFamily="34" charset="0"/>
                           <a:cs typeface="Arial" panose="020B0604020202020204" pitchFamily="34" charset="0"/>
                         </a:rPr>
                         <a:t>Div1</a:t>
                       </a:r>
-                      <a:endParaRPr lang="en-US" sz="3000" b="0" i="0" u="none" strike="noStrike">
+                      <a:endParaRPr lang="en-US" sz="3000" b="0" i="0" u="none" strike="noStrike" dirty="0">
                         <a:solidFill>
                           <a:srgbClr val="000000"/>
                         </a:solidFill>
@@ -13325,14 +12492,14 @@
                     <a:p>
                       <a:pPr algn="ctr" fontAlgn="ctr"/>
                       <a:r>
-                        <a:rPr lang="en-US" sz="3000" u="none" strike="noStrike">
+                        <a:rPr lang="en-US" sz="3000" u="none" strike="noStrike" dirty="0">
                           <a:effectLst/>
                           <a:latin typeface="Arial" panose="020B0604020202020204" pitchFamily="34" charset="0"/>
                           <a:cs typeface="Arial" panose="020B0604020202020204" pitchFamily="34" charset="0"/>
                         </a:rPr>
                         <a:t>387</a:t>
                       </a:r>
-                      <a:endParaRPr lang="en-US" sz="3000" b="0" i="0" u="none" strike="noStrike">
+                      <a:endParaRPr lang="en-US" sz="3000" b="0" i="0" u="none" strike="noStrike" dirty="0">
                         <a:solidFill>
                           <a:srgbClr val="000000"/>
                         </a:solidFill>
@@ -13351,14 +12518,14 @@
                     <a:p>
                       <a:pPr algn="ctr" fontAlgn="ctr"/>
                       <a:r>
-                        <a:rPr lang="en-US" sz="3000" u="none" strike="noStrike">
+                        <a:rPr lang="en-US" sz="3000" u="none" strike="noStrike" dirty="0">
                           <a:effectLst/>
                           <a:latin typeface="Arial" panose="020B0604020202020204" pitchFamily="34" charset="0"/>
                           <a:cs typeface="Arial" panose="020B0604020202020204" pitchFamily="34" charset="0"/>
                         </a:rPr>
                         <a:t>&gt;1</a:t>
                       </a:r>
-                      <a:endParaRPr lang="en-US" sz="3000" b="0" i="0" u="none" strike="noStrike">
+                      <a:endParaRPr lang="en-US" sz="3000" b="0" i="0" u="none" strike="noStrike" dirty="0">
                         <a:solidFill>
                           <a:srgbClr val="000000"/>
                         </a:solidFill>
@@ -13377,14 +12544,14 @@
                     <a:p>
                       <a:pPr algn="ctr" fontAlgn="ctr"/>
                       <a:r>
-                        <a:rPr lang="en-US" sz="3000" u="none" strike="noStrike">
+                        <a:rPr lang="en-US" sz="3000" u="none" strike="noStrike" dirty="0">
                           <a:effectLst/>
                           <a:latin typeface="Arial" panose="020B0604020202020204" pitchFamily="34" charset="0"/>
                           <a:cs typeface="Arial" panose="020B0604020202020204" pitchFamily="34" charset="0"/>
                         </a:rPr>
                         <a:t>0.027 - 0.66</a:t>
                       </a:r>
-                      <a:endParaRPr lang="en-US" sz="3000" b="0" i="0" u="none" strike="noStrike">
+                      <a:endParaRPr lang="en-US" sz="3000" b="0" i="0" u="none" strike="noStrike" dirty="0">
                         <a:solidFill>
                           <a:srgbClr val="000000"/>
                         </a:solidFill>
@@ -13410,14 +12577,14 @@
                     <a:p>
                       <a:pPr algn="l" fontAlgn="ctr"/>
                       <a:r>
-                        <a:rPr lang="en-US" sz="3000" u="none" strike="noStrike">
+                        <a:rPr lang="en-US" sz="3000" u="none" strike="noStrike" dirty="0">
                           <a:effectLst/>
                           <a:latin typeface="Arial" panose="020B0604020202020204" pitchFamily="34" charset="0"/>
                           <a:cs typeface="Arial" panose="020B0604020202020204" pitchFamily="34" charset="0"/>
                         </a:rPr>
                         <a:t>Div2</a:t>
                       </a:r>
-                      <a:endParaRPr lang="en-US" sz="3000" b="0" i="0" u="none" strike="noStrike">
+                      <a:endParaRPr lang="en-US" sz="3000" b="0" i="0" u="none" strike="noStrike" dirty="0">
                         <a:solidFill>
                           <a:srgbClr val="000000"/>
                         </a:solidFill>
@@ -13436,14 +12603,14 @@
                     <a:p>
                       <a:pPr algn="ctr" fontAlgn="ctr"/>
                       <a:r>
-                        <a:rPr lang="en-US" sz="3000" u="none" strike="noStrike">
+                        <a:rPr lang="en-US" sz="3000" u="none" strike="noStrike" dirty="0">
                           <a:effectLst/>
                           <a:latin typeface="Arial" panose="020B0604020202020204" pitchFamily="34" charset="0"/>
                           <a:cs typeface="Arial" panose="020B0604020202020204" pitchFamily="34" charset="0"/>
                         </a:rPr>
                         <a:t>393</a:t>
                       </a:r>
-                      <a:endParaRPr lang="en-US" sz="3000" b="0" i="0" u="none" strike="noStrike">
+                      <a:endParaRPr lang="en-US" sz="3000" b="0" i="0" u="none" strike="noStrike" dirty="0">
                         <a:solidFill>
                           <a:srgbClr val="000000"/>
                         </a:solidFill>
@@ -13462,14 +12629,14 @@
                     <a:p>
                       <a:pPr algn="ctr" fontAlgn="ctr"/>
                       <a:r>
-                        <a:rPr lang="en-US" sz="3000" u="none" strike="noStrike">
+                        <a:rPr lang="en-US" sz="3000" u="none" strike="noStrike" dirty="0">
                           <a:effectLst/>
                           <a:latin typeface="Arial" panose="020B0604020202020204" pitchFamily="34" charset="0"/>
                           <a:cs typeface="Arial" panose="020B0604020202020204" pitchFamily="34" charset="0"/>
                         </a:rPr>
                         <a:t>&gt;1</a:t>
                       </a:r>
-                      <a:endParaRPr lang="en-US" sz="3000" b="0" i="0" u="none" strike="noStrike">
+                      <a:endParaRPr lang="en-US" sz="3000" b="0" i="0" u="none" strike="noStrike" dirty="0">
                         <a:solidFill>
                           <a:srgbClr val="000000"/>
                         </a:solidFill>
@@ -13488,14 +12655,14 @@
                     <a:p>
                       <a:pPr algn="ctr" fontAlgn="ctr"/>
                       <a:r>
-                        <a:rPr lang="en-US" sz="3000" u="none" strike="noStrike">
+                        <a:rPr lang="en-US" sz="3000" u="none" strike="noStrike" dirty="0">
                           <a:effectLst/>
                           <a:latin typeface="Arial" panose="020B0604020202020204" pitchFamily="34" charset="0"/>
                           <a:cs typeface="Arial" panose="020B0604020202020204" pitchFamily="34" charset="0"/>
                         </a:rPr>
                         <a:t>0.66 - 1.95 </a:t>
                       </a:r>
-                      <a:endParaRPr lang="en-US" sz="3000" b="0" i="0" u="none" strike="noStrike">
+                      <a:endParaRPr lang="en-US" sz="3000" b="0" i="0" u="none" strike="noStrike" dirty="0">
                         <a:solidFill>
                           <a:srgbClr val="000000"/>
                         </a:solidFill>
@@ -13531,7 +12698,7 @@
         </p:nvSpPr>
         <p:spPr>
           <a:xfrm>
-            <a:off x="2636365" y="14376232"/>
+            <a:off x="2636365" y="14328106"/>
             <a:ext cx="3560473" cy="584775"/>
           </a:xfrm>
           <a:prstGeom prst="rect">
@@ -13563,7 +12730,7 @@
               <a:defRPr/>
             </a:pPr>
             <a:r>
-              <a:rPr lang="en-GB" sz="3200" b="1">
+              <a:rPr lang="en-GB" sz="3200" b="1" dirty="0">
                 <a:solidFill>
                   <a:schemeClr val="accent3">
                     <a:lumMod val="75000"/>
@@ -13591,7 +12758,7 @@
         </p:nvSpPr>
         <p:spPr>
           <a:xfrm>
-            <a:off x="9593498" y="14380428"/>
+            <a:off x="9593498" y="14332302"/>
             <a:ext cx="4306369" cy="584775"/>
           </a:xfrm>
           <a:prstGeom prst="rect">
@@ -13623,7 +12790,7 @@
               <a:defRPr/>
             </a:pPr>
             <a:r>
-              <a:rPr lang="en-GB" sz="3200" b="1">
+              <a:rPr lang="en-GB" sz="3200" b="1" dirty="0">
                 <a:solidFill>
                   <a:schemeClr val="accent2">
                     <a:lumMod val="75000"/>
@@ -13651,7 +12818,7 @@
         </p:nvSpPr>
         <p:spPr>
           <a:xfrm>
-            <a:off x="17737188" y="14306573"/>
+            <a:off x="17737188" y="14258447"/>
             <a:ext cx="2178142" cy="584775"/>
           </a:xfrm>
           <a:prstGeom prst="rect">
@@ -13683,7 +12850,7 @@
               <a:defRPr/>
             </a:pPr>
             <a:r>
-              <a:rPr kumimoji="0" lang="en-GB" sz="3200" b="1" i="0" u="none" strike="noStrike" kern="1200" cap="none" spc="0" normalizeH="0" baseline="0" noProof="0">
+              <a:rPr kumimoji="0" lang="en-GB" sz="3200" b="1" i="0" u="none" strike="noStrike" kern="1200" cap="none" spc="0" normalizeH="0" baseline="0" noProof="0" dirty="0">
                 <a:ln>
                   <a:noFill/>
                 </a:ln>
@@ -13718,7 +12885,7 @@
         </p:nvSpPr>
         <p:spPr>
           <a:xfrm>
-            <a:off x="23823333" y="14370611"/>
+            <a:off x="23823333" y="14322485"/>
             <a:ext cx="2957143" cy="584775"/>
           </a:xfrm>
           <a:prstGeom prst="rect">
@@ -13750,14 +12917,12 @@
               <a:defRPr/>
             </a:pPr>
             <a:r>
-              <a:rPr kumimoji="0" lang="en-GB" sz="3200" b="1" i="0" u="none" strike="noStrike" kern="1200" cap="none" spc="0" normalizeH="0" baseline="0" noProof="0">
+              <a:rPr kumimoji="0" lang="en-GB" sz="3200" b="1" i="0" u="none" strike="noStrike" kern="1200" cap="none" spc="0" normalizeH="0" baseline="0" noProof="0" dirty="0">
                 <a:ln>
                   <a:noFill/>
                 </a:ln>
                 <a:solidFill>
-                  <a:schemeClr val="tx2">
-                    <a:lumMod val="75000"/>
-                  </a:schemeClr>
+                  <a:srgbClr val="6C2E9A"/>
                 </a:solidFill>
                 <a:effectLst/>
                 <a:uLnTx/>
@@ -13768,11 +12933,9 @@
               </a:rPr>
               <a:t>Ordination</a:t>
             </a:r>
-            <a:endParaRPr lang="en-GB" sz="3200" b="1">
+            <a:endParaRPr lang="en-GB" sz="3200" b="1" dirty="0">
               <a:solidFill>
-                <a:schemeClr val="accent3">
-                  <a:lumMod val="75000"/>
-                </a:schemeClr>
+                <a:srgbClr val="6C2E9A"/>
               </a:solidFill>
               <a:latin typeface="Arial" panose="020B0604020202020204" pitchFamily="34" charset="0"/>
               <a:cs typeface="Arial" panose="020B0604020202020204" pitchFamily="34" charset="0"/>
@@ -13807,7 +12970,7 @@
         </p:blipFill>
         <p:spPr>
           <a:xfrm>
-            <a:off x="16073080" y="14975169"/>
+            <a:off x="16073080" y="14927043"/>
             <a:ext cx="5506358" cy="4929286"/>
           </a:xfrm>
           <a:prstGeom prst="rect">
@@ -13843,7 +13006,7 @@
         </p:blipFill>
         <p:spPr>
           <a:xfrm>
-            <a:off x="1561359" y="15144748"/>
+            <a:off x="1561359" y="15096622"/>
             <a:ext cx="6845484" cy="4747674"/>
           </a:xfrm>
           <a:prstGeom prst="rect">
@@ -13866,7 +13029,7 @@
         <p:spPr>
           <a:xfrm>
             <a:off x="21259513" y="23281656"/>
-            <a:ext cx="5805487" cy="830997"/>
+            <a:ext cx="8096537" cy="461665"/>
           </a:xfrm>
           <a:prstGeom prst="rect">
             <a:avLst/>
@@ -13880,7 +13043,7 @@
           <a:lstStyle/>
           <a:p>
             <a:r>
-              <a:rPr lang="en-US" sz="2400" b="0" i="0" u="none" strike="noStrike">
+              <a:rPr lang="en-US" sz="2400" b="0" i="0" u="none" strike="noStrike" dirty="0">
                 <a:solidFill>
                   <a:srgbClr val="000000"/>
                 </a:solidFill>
@@ -13890,7 +13053,7 @@
               </a:rPr>
               <a:t>https://github.com/computational-nutrition-lab/DietR</a:t>
             </a:r>
-            <a:endParaRPr lang="en-US" sz="2400" b="0" i="0" u="none" strike="noStrike">
+            <a:endParaRPr lang="en-US" sz="2400" b="0" i="0" u="none" strike="noStrike" dirty="0">
               <a:solidFill>
                 <a:srgbClr val="000000"/>
               </a:solidFill>
@@ -13914,8 +13077,8 @@
         </p:nvSpPr>
         <p:spPr>
           <a:xfrm>
-            <a:off x="21168500" y="25070762"/>
-            <a:ext cx="5805487" cy="830997"/>
+            <a:off x="21258920" y="24763001"/>
+            <a:ext cx="7741980" cy="461665"/>
           </a:xfrm>
           <a:prstGeom prst="rect">
             <a:avLst/>
@@ -13929,7 +13092,7 @@
           <a:lstStyle/>
           <a:p>
             <a:r>
-              <a:rPr lang="en-US" sz="2400" b="0" i="0" u="sng" strike="noStrike">
+              <a:rPr lang="en-US" sz="2400" b="0" i="0" u="sng" strike="noStrike" dirty="0">
                 <a:solidFill>
                   <a:srgbClr val="1155CC"/>
                 </a:solidFill>
@@ -13939,7 +13102,7 @@
               </a:rPr>
               <a:t>https://computational-nutrition-lab.github.io/DietR/</a:t>
             </a:r>
-            <a:endParaRPr lang="en-US" sz="2400"/>
+            <a:endParaRPr lang="en-US" sz="2400" dirty="0"/>
           </a:p>
         </p:txBody>
       </p:sp>
@@ -13974,8 +13137,8 @@
         </p:blipFill>
         <p:spPr>
           <a:xfrm rot="11541664">
-            <a:off x="27761382" y="26352338"/>
-            <a:ext cx="1251434" cy="1251434"/>
+            <a:off x="28441335" y="26175920"/>
+            <a:ext cx="1013692" cy="1013692"/>
           </a:xfrm>
           <a:prstGeom prst="rect">
             <a:avLst/>
@@ -13996,7 +13159,7 @@
         </p:nvSpPr>
         <p:spPr>
           <a:xfrm>
-            <a:off x="1035418" y="22536053"/>
+            <a:off x="794788" y="22634024"/>
             <a:ext cx="5245192" cy="584775"/>
           </a:xfrm>
           <a:prstGeom prst="homePlate">
@@ -14033,7 +13196,7 @@
               <a:defRPr/>
             </a:pPr>
             <a:r>
-              <a:rPr lang="en-GB" sz="3200" b="1">
+              <a:rPr lang="en-GB" sz="3200" b="1" dirty="0">
                 <a:solidFill>
                   <a:schemeClr val="tx1">
                     <a:lumMod val="85000"/>
@@ -14062,7 +13225,7 @@
         </p:nvSpPr>
         <p:spPr>
           <a:xfrm>
-            <a:off x="1047533" y="24626034"/>
+            <a:off x="782840" y="24756662"/>
             <a:ext cx="3145612" cy="584775"/>
           </a:xfrm>
           <a:prstGeom prst="homePlate">
@@ -14099,7 +13262,7 @@
               <a:defRPr/>
             </a:pPr>
             <a:r>
-              <a:rPr lang="en-GB" sz="3200" b="1">
+              <a:rPr lang="en-GB" sz="3200" b="1" dirty="0">
                 <a:solidFill>
                   <a:schemeClr val="tx1">
                     <a:lumMod val="85000"/>
@@ -14177,7 +13340,7 @@
         </p:blipFill>
         <p:spPr>
           <a:xfrm>
-            <a:off x="8847094" y="15116094"/>
+            <a:off x="8847094" y="15067968"/>
             <a:ext cx="6626758" cy="4776328"/>
           </a:xfrm>
           <a:prstGeom prst="rect">
@@ -14212,7 +13375,7 @@
         </p:blipFill>
         <p:spPr>
           <a:xfrm>
-            <a:off x="22632160" y="15109845"/>
+            <a:off x="22632160" y="15061719"/>
             <a:ext cx="6400813" cy="4659935"/>
           </a:xfrm>
           <a:prstGeom prst="rect">
@@ -14234,7 +13397,7 @@
         </p:nvSpPr>
         <p:spPr>
           <a:xfrm>
-            <a:off x="5582654" y="13170266"/>
+            <a:off x="5582654" y="13122140"/>
             <a:ext cx="23327826" cy="1077218"/>
           </a:xfrm>
           <a:prstGeom prst="rect">
@@ -14249,7 +13412,7 @@
           <a:lstStyle/>
           <a:p>
             <a:r>
-              <a:rPr lang="en-US" sz="3200">
+              <a:rPr lang="en-US" sz="3200" dirty="0">
                 <a:solidFill>
                   <a:schemeClr val="tx1">
                     <a:lumMod val="85000"/>
@@ -14261,10 +13424,6 @@
               </a:rPr>
               <a:t>Example dataset VVKAJ contains ASA24 dietary records of 15 people with 5 different diets, Vegetarian, Vegan, Keto, American, and Japanese for 3 days. </a:t>
             </a:r>
-            <a:endParaRPr lang="en-US" sz="3200">
-              <a:latin typeface="Arial" panose="020B0604020202020204" pitchFamily="34" charset="0"/>
-              <a:cs typeface="Arial" panose="020B0604020202020204" pitchFamily="34" charset="0"/>
-            </a:endParaRPr>
           </a:p>
         </p:txBody>
       </p:sp>
@@ -14282,7 +13441,7 @@
         </p:nvSpPr>
         <p:spPr>
           <a:xfrm>
-            <a:off x="1424724" y="13157550"/>
+            <a:off x="1424724" y="13012766"/>
             <a:ext cx="4157930" cy="707886"/>
           </a:xfrm>
           <a:prstGeom prst="rect">
@@ -14297,22 +13456,15 @@
           <a:lstStyle/>
           <a:p>
             <a:r>
-              <a:rPr lang="en-GB" sz="4000" b="1">
+              <a:rPr lang="en-GB" sz="4000" b="1" dirty="0">
                 <a:solidFill>
-                  <a:srgbClr val="006600"/>
+                  <a:srgbClr val="1F3600"/>
                 </a:solidFill>
                 <a:latin typeface="Consolas" panose="020B0609020204030204" pitchFamily="49" charset="0"/>
                 <a:cs typeface="Aharoni" panose="02010803020104030203" pitchFamily="2" charset="-79"/>
               </a:rPr>
               <a:t>Demonstration</a:t>
             </a:r>
-            <a:endParaRPr lang="en-GB" sz="4000" b="1" dirty="0">
-              <a:solidFill>
-                <a:srgbClr val="006600"/>
-              </a:solidFill>
-              <a:latin typeface="Consolas" panose="020B0609020204030204" pitchFamily="49" charset="0"/>
-              <a:cs typeface="Aharoni" panose="02010803020104030203" pitchFamily="2" charset="-79"/>
-            </a:endParaRPr>
           </a:p>
         </p:txBody>
       </p:sp>
@@ -14330,7 +13482,7 @@
         </p:nvSpPr>
         <p:spPr>
           <a:xfrm>
-            <a:off x="1755570" y="19898624"/>
+            <a:off x="1755570" y="19850498"/>
             <a:ext cx="5748643" cy="954107"/>
           </a:xfrm>
           <a:prstGeom prst="rect">
@@ -14352,6 +13504,20 @@
               </a:buClr>
               <a:buSzPct val="130000"/>
             </a:pPr>
+            <a:r>
+              <a:rPr lang="en-AU" sz="2800" dirty="0">
+                <a:solidFill>
+                  <a:schemeClr val="tx1">
+                    <a:lumMod val="85000"/>
+                    <a:lumOff val="15000"/>
+                  </a:schemeClr>
+                </a:solidFill>
+                <a:latin typeface="Arial" panose="020B0604020202020204" pitchFamily="34" charset="0"/>
+                <a:ea typeface="Source Sans Pro" panose="020B0503030403020204" pitchFamily="34" charset="0"/>
+                <a:cs typeface="Arial" panose="020B0604020202020204" pitchFamily="34" charset="0"/>
+              </a:rPr>
+              <a:t>%KCAL from three macronutrients</a:t>
+            </a:r>
             <a:r>
               <a:rPr lang="en-AU" sz="2800">
                 <a:solidFill>
@@ -14364,7 +13530,21 @@
                 <a:ea typeface="Source Sans Pro" panose="020B0503030403020204" pitchFamily="34" charset="0"/>
                 <a:cs typeface="Arial" panose="020B0604020202020204" pitchFamily="34" charset="0"/>
               </a:rPr>
-              <a:t>%KCAL from three macronutrients. Errorbars: standard deviation.</a:t>
+              <a:t>. </a:t>
+            </a:r>
+            <a:r>
+              <a:rPr lang="en-AU" sz="2800" dirty="0">
+                <a:solidFill>
+                  <a:schemeClr val="tx1">
+                    <a:lumMod val="85000"/>
+                    <a:lumOff val="15000"/>
+                  </a:schemeClr>
+                </a:solidFill>
+                <a:latin typeface="Arial" panose="020B0604020202020204" pitchFamily="34" charset="0"/>
+                <a:ea typeface="Source Sans Pro" panose="020B0503030403020204" pitchFamily="34" charset="0"/>
+                <a:cs typeface="Arial" panose="020B0604020202020204" pitchFamily="34" charset="0"/>
+              </a:rPr>
+              <a:t>Error bars: standard deviation.</a:t>
             </a:r>
           </a:p>
         </p:txBody>
@@ -14383,7 +13563,7 @@
         </p:nvSpPr>
         <p:spPr>
           <a:xfrm>
-            <a:off x="9111608" y="19935419"/>
+            <a:off x="9111608" y="19887293"/>
             <a:ext cx="5414973" cy="954107"/>
           </a:xfrm>
           <a:prstGeom prst="rect">
@@ -14406,7 +13586,7 @@
               <a:buSzPct val="130000"/>
             </a:pPr>
             <a:r>
-              <a:rPr lang="en-AU" sz="2800">
+              <a:rPr lang="en-AU" sz="2800" dirty="0">
                 <a:solidFill>
                   <a:schemeClr val="tx1">
                     <a:lumMod val="85000"/>
@@ -14436,7 +13616,7 @@
         </p:nvSpPr>
         <p:spPr>
           <a:xfrm>
-            <a:off x="16530383" y="19992542"/>
+            <a:off x="16530383" y="19944416"/>
             <a:ext cx="5414973" cy="954107"/>
           </a:xfrm>
           <a:prstGeom prst="rect">
@@ -14459,7 +13639,7 @@
               <a:buSzPct val="130000"/>
             </a:pPr>
             <a:r>
-              <a:rPr lang="en-AU" sz="2800">
+              <a:rPr lang="en-AU" sz="2800" dirty="0">
                 <a:solidFill>
                   <a:schemeClr val="tx1">
                     <a:lumMod val="85000"/>
@@ -14489,7 +13669,7 @@
         </p:nvSpPr>
         <p:spPr>
           <a:xfrm>
-            <a:off x="22764298" y="19860870"/>
+            <a:off x="22764298" y="19812744"/>
             <a:ext cx="6146182" cy="954107"/>
           </a:xfrm>
           <a:prstGeom prst="rect">
@@ -14512,7 +13692,7 @@
               <a:buSzPct val="130000"/>
             </a:pPr>
             <a:r>
-              <a:rPr lang="en-AU" sz="2800">
+              <a:rPr lang="en-AU" sz="2800" dirty="0">
                 <a:solidFill>
                   <a:schemeClr val="tx1">
                     <a:lumMod val="85000"/>
@@ -14542,7 +13722,7 @@
         </p:nvSpPr>
         <p:spPr>
           <a:xfrm>
-            <a:off x="1047533" y="29199916"/>
+            <a:off x="806903" y="29363201"/>
             <a:ext cx="6083392" cy="584775"/>
           </a:xfrm>
           <a:prstGeom prst="homePlate">
@@ -14579,7 +13759,7 @@
               <a:defRPr/>
             </a:pPr>
             <a:r>
-              <a:rPr lang="en-GB" sz="3200" b="1">
+              <a:rPr lang="en-GB" sz="3200" b="1" dirty="0">
                 <a:solidFill>
                   <a:schemeClr val="tx1">
                     <a:lumMod val="85000"/>
@@ -14608,7 +13788,7 @@
         </p:nvSpPr>
         <p:spPr>
           <a:xfrm>
-            <a:off x="21799621" y="26150833"/>
+            <a:off x="21799621" y="25492478"/>
             <a:ext cx="4974965" cy="646331"/>
           </a:xfrm>
           <a:prstGeom prst="rect">
@@ -14625,7 +13805,7 @@
           <a:lstStyle/>
           <a:p>
             <a:r>
-              <a:rPr lang="en-AU" sz="3600">
+              <a:rPr lang="en-AU" sz="3600" dirty="0">
                 <a:solidFill>
                   <a:schemeClr val="tx1">
                     <a:lumMod val="85000"/>
@@ -14664,7 +13844,7 @@
         </p:nvSpPr>
         <p:spPr>
           <a:xfrm>
-            <a:off x="21327181" y="26219327"/>
+            <a:off x="21327181" y="25560972"/>
             <a:ext cx="396512" cy="531672"/>
           </a:xfrm>
           <a:prstGeom prst="rightArrow">
@@ -14722,7 +13902,7 @@
         </p:nvSpPr>
         <p:spPr>
           <a:xfrm>
-            <a:off x="21202990" y="26801038"/>
+            <a:off x="21258920" y="26203127"/>
             <a:ext cx="5805487" cy="461665"/>
           </a:xfrm>
           <a:prstGeom prst="rect">
@@ -14737,7 +13917,7 @@
           <a:lstStyle/>
           <a:p>
             <a:r>
-              <a:rPr lang="en-US" sz="2400" b="0" i="0" u="sng" strike="noStrike">
+              <a:rPr lang="en-US" sz="2400" b="0" i="0" u="sng" strike="noStrike" dirty="0">
                 <a:solidFill>
                   <a:srgbClr val="1155CC"/>
                 </a:solidFill>
@@ -14747,7 +13927,7 @@
               </a:rPr>
               <a:t>https://</a:t>
             </a:r>
-            <a:endParaRPr lang="en-US" sz="2400"/>
+            <a:endParaRPr lang="en-US" sz="2400" dirty="0"/>
           </a:p>
         </p:txBody>
       </p:sp>
@@ -14765,7 +13945,7 @@
         </p:nvSpPr>
         <p:spPr>
           <a:xfrm>
-            <a:off x="1594907" y="30060670"/>
+            <a:off x="1354277" y="30223955"/>
             <a:ext cx="18510354" cy="2092881"/>
           </a:xfrm>
           <a:prstGeom prst="rect">
@@ -14793,7 +13973,7 @@
               <a:buChar char="•"/>
             </a:pPr>
             <a:r>
-              <a:rPr lang="en-US" sz="3000">
+              <a:rPr lang="en-US" sz="3000" dirty="0">
                 <a:solidFill>
                   <a:schemeClr val="tx1">
                     <a:lumMod val="85000"/>
@@ -14821,7 +14001,7 @@
               <a:buChar char="•"/>
             </a:pPr>
             <a:r>
-              <a:rPr lang="en-US" sz="3000">
+              <a:rPr lang="en-US" sz="3000" dirty="0">
                 <a:solidFill>
                   <a:schemeClr val="tx1">
                     <a:lumMod val="85000"/>
@@ -14849,7 +14029,7 @@
               <a:buChar char="•"/>
             </a:pPr>
             <a:r>
-              <a:rPr lang="en-US" sz="3000">
+              <a:rPr lang="en-US" sz="3000" dirty="0">
                 <a:solidFill>
                   <a:schemeClr val="tx1">
                     <a:lumMod val="85000"/>
@@ -14859,18 +14039,8 @@
                 <a:latin typeface="Arial" panose="020B0604020202020204" pitchFamily="34" charset="0"/>
                 <a:cs typeface="Arial" panose="020B0604020202020204" pitchFamily="34" charset="0"/>
               </a:rPr>
-              <a:t>In contrast, KCAL intake was larger as the diversity increased. Similar observation has been reported by Mitchell 2021 [ref] with pulses (part of legumes).</a:t>
-            </a:r>
-            <a:endParaRPr lang="en-US" sz="3000" dirty="0">
-              <a:solidFill>
-                <a:schemeClr val="tx1">
-                  <a:lumMod val="85000"/>
-                  <a:lumOff val="15000"/>
-                </a:schemeClr>
-              </a:solidFill>
-              <a:latin typeface="Arial" panose="020B0604020202020204" pitchFamily="34" charset="0"/>
-              <a:cs typeface="Arial" panose="020B0604020202020204" pitchFamily="34" charset="0"/>
-            </a:endParaRPr>
+              <a:t>In contrast, KCAL intake was larger as the diversity increased. Similar observation has been reported by Mitchell 2021 [4] with pulses (part of legumes).</a:t>
+            </a:r>
           </a:p>
         </p:txBody>
       </p:sp>
@@ -14888,7 +14058,7 @@
         </p:nvSpPr>
         <p:spPr>
           <a:xfrm>
-            <a:off x="1691111" y="38071274"/>
+            <a:off x="1172098" y="38169244"/>
             <a:ext cx="13382036" cy="830997"/>
           </a:xfrm>
           <a:prstGeom prst="rect">
@@ -14911,17 +14081,43 @@
               <a:buSzPct val="130000"/>
             </a:pPr>
             <a:r>
-              <a:rPr lang="en-US" sz="2400">
+              <a:rPr lang="en-US" sz="2400" dirty="0">
                 <a:solidFill>
                   <a:schemeClr val="tx1">
-                    <a:lumMod val="65000"/>
-                    <a:lumOff val="35000"/>
+                    <a:lumMod val="75000"/>
+                    <a:lumOff val="25000"/>
                   </a:schemeClr>
                 </a:solidFill>
                 <a:latin typeface="Arial" panose="020B0604020202020204" pitchFamily="34" charset="0"/>
                 <a:cs typeface="Arial" panose="020B0604020202020204" pitchFamily="34" charset="0"/>
               </a:rPr>
-              <a:t>Emmeans ± SE; pairwise comparisons with no p-values are not significantly different.</a:t>
+              <a:t>Emmeans ± SE; pairwise comparisons with no </a:t>
+            </a:r>
+            <a:r>
+              <a:rPr lang="en-US" sz="2400" i="1" dirty="0">
+                <a:solidFill>
+                  <a:schemeClr val="tx1">
+                    <a:lumMod val="75000"/>
+                    <a:lumOff val="25000"/>
+                  </a:schemeClr>
+                </a:solidFill>
+                <a:latin typeface="Arial" panose="020B0604020202020204" pitchFamily="34" charset="0"/>
+                <a:cs typeface="Arial" panose="020B0604020202020204" pitchFamily="34" charset="0"/>
+              </a:rPr>
+              <a:t>p</a:t>
+            </a:r>
+            <a:r>
+              <a:rPr lang="en-US" sz="2400" dirty="0">
+                <a:solidFill>
+                  <a:schemeClr val="tx1">
+                    <a:lumMod val="75000"/>
+                    <a:lumOff val="25000"/>
+                  </a:schemeClr>
+                </a:solidFill>
+                <a:latin typeface="Arial" panose="020B0604020202020204" pitchFamily="34" charset="0"/>
+                <a:cs typeface="Arial" panose="020B0604020202020204" pitchFamily="34" charset="0"/>
+              </a:rPr>
+              <a:t>-values are not significantly different.</a:t>
             </a:r>
           </a:p>
           <a:p>
@@ -14934,11 +14130,11 @@
               <a:buSzPct val="130000"/>
             </a:pPr>
             <a:r>
-              <a:rPr lang="en-US" sz="2400">
+              <a:rPr lang="en-US" sz="2400" dirty="0">
                 <a:solidFill>
                   <a:schemeClr val="tx1">
-                    <a:lumMod val="65000"/>
-                    <a:lumOff val="35000"/>
+                    <a:lumMod val="75000"/>
+                    <a:lumOff val="25000"/>
                   </a:schemeClr>
                 </a:solidFill>
                 <a:latin typeface="Arial" panose="020B0604020202020204" pitchFamily="34" charset="0"/>
@@ -14946,16 +14142,6 @@
               </a:rPr>
               <a:t>For Waist and BMI, KCAL did not have a major effect to the ancova model, thus was not included. </a:t>
             </a:r>
-            <a:endParaRPr lang="en-US" sz="2400" dirty="0">
-              <a:solidFill>
-                <a:schemeClr val="tx1">
-                  <a:lumMod val="65000"/>
-                  <a:lumOff val="35000"/>
-                </a:schemeClr>
-              </a:solidFill>
-              <a:latin typeface="Arial" panose="020B0604020202020204" pitchFamily="34" charset="0"/>
-              <a:cs typeface="Arial" panose="020B0604020202020204" pitchFamily="34" charset="0"/>
-            </a:endParaRPr>
           </a:p>
         </p:txBody>
       </p:sp>
@@ -14973,7 +14159,7 @@
         </p:nvGrpSpPr>
         <p:grpSpPr>
           <a:xfrm>
-            <a:off x="1724966" y="32564087"/>
+            <a:off x="1484336" y="32727372"/>
             <a:ext cx="6378780" cy="5554754"/>
             <a:chOff x="1755570" y="32169043"/>
             <a:chExt cx="6378780" cy="5554754"/>
@@ -15050,7 +14236,7 @@
             <a:lstStyle/>
             <a:p>
               <a:pPr algn="ctr"/>
-              <a:endParaRPr lang="en-US"/>
+              <a:endParaRPr lang="en-US" dirty="0"/>
             </a:p>
           </p:txBody>
         </p:sp>
@@ -15091,7 +14277,7 @@
                 <a:buSzPct val="130000"/>
               </a:pPr>
               <a:r>
-                <a:rPr lang="en-US" sz="2400">
+                <a:rPr lang="en-US" sz="2400" dirty="0">
                   <a:solidFill>
                     <a:schemeClr val="tx1">
                       <a:lumMod val="65000"/>
@@ -15103,16 +14289,6 @@
                 </a:rPr>
                 <a:t>&lt; 0.0001</a:t>
               </a:r>
-              <a:endParaRPr lang="en-US" sz="2400" dirty="0">
-                <a:solidFill>
-                  <a:schemeClr val="tx1">
-                    <a:lumMod val="65000"/>
-                    <a:lumOff val="35000"/>
-                  </a:schemeClr>
-                </a:solidFill>
-                <a:latin typeface="Arial" panose="020B0604020202020204" pitchFamily="34" charset="0"/>
-                <a:cs typeface="Arial" panose="020B0604020202020204" pitchFamily="34" charset="0"/>
-              </a:endParaRPr>
             </a:p>
           </p:txBody>
         </p:sp>
@@ -15157,7 +14333,7 @@
             <a:lstStyle/>
             <a:p>
               <a:pPr algn="ctr"/>
-              <a:endParaRPr lang="en-US"/>
+              <a:endParaRPr lang="en-US" dirty="0"/>
             </a:p>
           </p:txBody>
         </p:sp>
@@ -15198,7 +14374,7 @@
                 <a:buSzPct val="130000"/>
               </a:pPr>
               <a:r>
-                <a:rPr lang="en-US" sz="2400">
+                <a:rPr lang="en-US" sz="2400" dirty="0">
                   <a:solidFill>
                     <a:schemeClr val="tx1">
                       <a:lumMod val="65000"/>
@@ -15210,16 +14386,6 @@
                 </a:rPr>
                 <a:t>&lt; 0.0001</a:t>
               </a:r>
-              <a:endParaRPr lang="en-US" sz="2400" dirty="0">
-                <a:solidFill>
-                  <a:schemeClr val="tx1">
-                    <a:lumMod val="65000"/>
-                    <a:lumOff val="35000"/>
-                  </a:schemeClr>
-                </a:solidFill>
-                <a:latin typeface="Arial" panose="020B0604020202020204" pitchFamily="34" charset="0"/>
-                <a:cs typeface="Arial" panose="020B0604020202020204" pitchFamily="34" charset="0"/>
-              </a:endParaRPr>
             </a:p>
           </p:txBody>
         </p:sp>
@@ -15264,7 +14430,7 @@
             <a:lstStyle/>
             <a:p>
               <a:pPr algn="ctr"/>
-              <a:endParaRPr lang="en-US"/>
+              <a:endParaRPr lang="en-US" dirty="0"/>
             </a:p>
           </p:txBody>
         </p:sp>
@@ -15305,7 +14471,7 @@
                 <a:buSzPct val="130000"/>
               </a:pPr>
               <a:r>
-                <a:rPr lang="en-US" sz="2400">
+                <a:rPr lang="en-US" sz="2400" dirty="0">
                   <a:solidFill>
                     <a:schemeClr val="tx1">
                       <a:lumMod val="65000"/>
@@ -15317,293 +14483,6 @@
                 </a:rPr>
                 <a:t>0.04</a:t>
               </a:r>
-              <a:endParaRPr lang="en-US" sz="2400" dirty="0">
-                <a:solidFill>
-                  <a:schemeClr val="tx1">
-                    <a:lumMod val="65000"/>
-                    <a:lumOff val="35000"/>
-                  </a:schemeClr>
-                </a:solidFill>
-                <a:latin typeface="Arial" panose="020B0604020202020204" pitchFamily="34" charset="0"/>
-                <a:cs typeface="Arial" panose="020B0604020202020204" pitchFamily="34" charset="0"/>
-              </a:endParaRPr>
-            </a:p>
-          </p:txBody>
-        </p:sp>
-      </p:grpSp>
-      <p:grpSp>
-        <p:nvGrpSpPr>
-          <p:cNvPr id="62" name="Group 61">
-            <a:extLst>
-              <a:ext uri="{FF2B5EF4-FFF2-40B4-BE49-F238E27FC236}">
-                <a16:creationId xmlns:a16="http://schemas.microsoft.com/office/drawing/2014/main" id="{2E41853C-6D6A-1CE5-3D94-5E8424D00F12}"/>
-              </a:ext>
-            </a:extLst>
-          </p:cNvPr>
-          <p:cNvGrpSpPr/>
-          <p:nvPr/>
-        </p:nvGrpSpPr>
-        <p:grpSpPr>
-          <a:xfrm>
-            <a:off x="-6812270" y="32682869"/>
-            <a:ext cx="6378779" cy="5562455"/>
-            <a:chOff x="8614157" y="32161341"/>
-            <a:chExt cx="6378779" cy="5562455"/>
-          </a:xfrm>
-        </p:grpSpPr>
-        <p:graphicFrame>
-          <p:nvGraphicFramePr>
-            <p:cNvPr id="53" name="Chart 52">
-              <a:extLst>
-                <a:ext uri="{FF2B5EF4-FFF2-40B4-BE49-F238E27FC236}">
-                  <a16:creationId xmlns:a16="http://schemas.microsoft.com/office/drawing/2014/main" id="{4D535927-A1F8-4FFC-A1B7-6297A959B02A}"/>
-                </a:ext>
-              </a:extLst>
-            </p:cNvPr>
-            <p:cNvGraphicFramePr>
-              <a:graphicFrameLocks/>
-            </p:cNvGraphicFramePr>
-            <p:nvPr>
-              <p:extLst>
-                <p:ext uri="{D42A27DB-BD31-4B8C-83A1-F6EECF244321}">
-                  <p14:modId xmlns:p14="http://schemas.microsoft.com/office/powerpoint/2010/main" val="1163634534"/>
-                </p:ext>
-              </p:extLst>
-            </p:nvPr>
-          </p:nvGraphicFramePr>
-          <p:xfrm>
-            <a:off x="8614157" y="32161341"/>
-            <a:ext cx="6378779" cy="5562455"/>
-          </p:xfrm>
-          <a:graphic>
-            <a:graphicData uri="http://schemas.openxmlformats.org/drawingml/2006/chart">
-              <c:chart xmlns:c="http://schemas.openxmlformats.org/drawingml/2006/chart" xmlns:r="http://schemas.openxmlformats.org/officeDocument/2006/relationships" r:id="rId14"/>
-            </a:graphicData>
-          </a:graphic>
-        </p:graphicFrame>
-        <p:sp>
-          <p:nvSpPr>
-            <p:cNvPr id="56" name="TextBox 55">
-              <a:extLst>
-                <a:ext uri="{FF2B5EF4-FFF2-40B4-BE49-F238E27FC236}">
-                  <a16:creationId xmlns:a16="http://schemas.microsoft.com/office/drawing/2014/main" id="{FCAAF5D5-3996-3F9A-C961-EA0CAA411561}"/>
-                </a:ext>
-              </a:extLst>
-            </p:cNvPr>
-            <p:cNvSpPr txBox="1"/>
-            <p:nvPr/>
-          </p:nvSpPr>
-          <p:spPr>
-            <a:xfrm>
-              <a:off x="12108757" y="33225461"/>
-              <a:ext cx="1754858" cy="461665"/>
-            </a:xfrm>
-            <a:prstGeom prst="rect">
-              <a:avLst/>
-            </a:prstGeom>
-            <a:noFill/>
-          </p:spPr>
-          <p:txBody>
-            <a:bodyPr wrap="square" rtlCol="0">
-              <a:spAutoFit/>
-            </a:bodyPr>
-            <a:lstStyle/>
-            <a:p>
-              <a:pPr algn="ctr">
-                <a:buClr>
-                  <a:schemeClr val="accent3">
-                    <a:lumMod val="75000"/>
-                  </a:schemeClr>
-                </a:buClr>
-                <a:buSzPct val="130000"/>
-              </a:pPr>
-              <a:r>
-                <a:rPr lang="en-US" sz="2400">
-                  <a:solidFill>
-                    <a:schemeClr val="tx1">
-                      <a:lumMod val="65000"/>
-                      <a:lumOff val="35000"/>
-                    </a:schemeClr>
-                  </a:solidFill>
-                  <a:latin typeface="Arial" panose="020B0604020202020204" pitchFamily="34" charset="0"/>
-                  <a:cs typeface="Arial" panose="020B0604020202020204" pitchFamily="34" charset="0"/>
-                </a:rPr>
-                <a:t>&lt; 0.0001</a:t>
-              </a:r>
-              <a:endParaRPr lang="en-US" sz="2400" dirty="0">
-                <a:solidFill>
-                  <a:schemeClr val="tx1">
-                    <a:lumMod val="65000"/>
-                    <a:lumOff val="35000"/>
-                  </a:schemeClr>
-                </a:solidFill>
-                <a:latin typeface="Arial" panose="020B0604020202020204" pitchFamily="34" charset="0"/>
-                <a:cs typeface="Arial" panose="020B0604020202020204" pitchFamily="34" charset="0"/>
-              </a:endParaRPr>
-            </a:p>
-          </p:txBody>
-        </p:sp>
-        <p:sp>
-          <p:nvSpPr>
-            <p:cNvPr id="57" name="Left Bracket 56">
-              <a:extLst>
-                <a:ext uri="{FF2B5EF4-FFF2-40B4-BE49-F238E27FC236}">
-                  <a16:creationId xmlns:a16="http://schemas.microsoft.com/office/drawing/2014/main" id="{7B05A5D1-5531-47FB-2FA1-2B477FBCC4E9}"/>
-                </a:ext>
-              </a:extLst>
-            </p:cNvPr>
-            <p:cNvSpPr/>
-            <p:nvPr/>
-          </p:nvSpPr>
-          <p:spPr>
-            <a:xfrm rot="5400000">
-              <a:off x="12893667" y="32450983"/>
-              <a:ext cx="189006" cy="2560320"/>
-            </a:xfrm>
-            <a:prstGeom prst="leftBracket">
-              <a:avLst/>
-            </a:prstGeom>
-            <a:ln w="22225">
-              <a:solidFill>
-                <a:schemeClr val="accent5">
-                  <a:lumMod val="90000"/>
-                </a:schemeClr>
-              </a:solidFill>
-            </a:ln>
-          </p:spPr>
-          <p:style>
-            <a:lnRef idx="1">
-              <a:schemeClr val="accent1"/>
-            </a:lnRef>
-            <a:fillRef idx="0">
-              <a:schemeClr val="accent1"/>
-            </a:fillRef>
-            <a:effectRef idx="0">
-              <a:schemeClr val="accent1"/>
-            </a:effectRef>
-            <a:fontRef idx="minor">
-              <a:schemeClr val="tx1"/>
-            </a:fontRef>
-          </p:style>
-          <p:txBody>
-            <a:bodyPr rtlCol="0" anchor="ctr"/>
-            <a:lstStyle/>
-            <a:p>
-              <a:pPr algn="ctr"/>
-              <a:endParaRPr lang="en-US"/>
-            </a:p>
-          </p:txBody>
-        </p:sp>
-        <p:sp>
-          <p:nvSpPr>
-            <p:cNvPr id="58" name="TextBox 57">
-              <a:extLst>
-                <a:ext uri="{FF2B5EF4-FFF2-40B4-BE49-F238E27FC236}">
-                  <a16:creationId xmlns:a16="http://schemas.microsoft.com/office/drawing/2014/main" id="{53E370B7-6B3D-1B0D-ECB5-292820002DF5}"/>
-                </a:ext>
-              </a:extLst>
-            </p:cNvPr>
-            <p:cNvSpPr txBox="1"/>
-            <p:nvPr/>
-          </p:nvSpPr>
-          <p:spPr>
-            <a:xfrm>
-              <a:off x="11516381" y="32643363"/>
-              <a:ext cx="1754858" cy="461665"/>
-            </a:xfrm>
-            <a:prstGeom prst="rect">
-              <a:avLst/>
-            </a:prstGeom>
-            <a:noFill/>
-          </p:spPr>
-          <p:txBody>
-            <a:bodyPr wrap="square" rtlCol="0">
-              <a:spAutoFit/>
-            </a:bodyPr>
-            <a:lstStyle/>
-            <a:p>
-              <a:pPr algn="ctr">
-                <a:buClr>
-                  <a:schemeClr val="accent3">
-                    <a:lumMod val="75000"/>
-                  </a:schemeClr>
-                </a:buClr>
-                <a:buSzPct val="130000"/>
-              </a:pPr>
-              <a:r>
-                <a:rPr lang="en-US" sz="2400">
-                  <a:solidFill>
-                    <a:schemeClr val="tx1">
-                      <a:lumMod val="65000"/>
-                      <a:lumOff val="35000"/>
-                    </a:schemeClr>
-                  </a:solidFill>
-                  <a:latin typeface="Arial" panose="020B0604020202020204" pitchFamily="34" charset="0"/>
-                  <a:cs typeface="Arial" panose="020B0604020202020204" pitchFamily="34" charset="0"/>
-                </a:rPr>
-                <a:t>&lt; 0.0001</a:t>
-              </a:r>
-              <a:endParaRPr lang="en-US" sz="2400" dirty="0">
-                <a:solidFill>
-                  <a:schemeClr val="tx1">
-                    <a:lumMod val="65000"/>
-                    <a:lumOff val="35000"/>
-                  </a:schemeClr>
-                </a:solidFill>
-                <a:latin typeface="Arial" panose="020B0604020202020204" pitchFamily="34" charset="0"/>
-                <a:cs typeface="Arial" panose="020B0604020202020204" pitchFamily="34" charset="0"/>
-              </a:endParaRPr>
-            </a:p>
-          </p:txBody>
-        </p:sp>
-        <p:sp>
-          <p:nvSpPr>
-            <p:cNvPr id="59" name="Left Bracket 58">
-              <a:extLst>
-                <a:ext uri="{FF2B5EF4-FFF2-40B4-BE49-F238E27FC236}">
-                  <a16:creationId xmlns:a16="http://schemas.microsoft.com/office/drawing/2014/main" id="{F5A4BE5E-90C7-C0CF-FF60-4572748A5F27}"/>
-                </a:ext>
-              </a:extLst>
-            </p:cNvPr>
-            <p:cNvSpPr/>
-            <p:nvPr/>
-          </p:nvSpPr>
-          <p:spPr>
-            <a:xfrm rot="5400000">
-              <a:off x="12299307" y="31296213"/>
-              <a:ext cx="189006" cy="3749040"/>
-            </a:xfrm>
-            <a:prstGeom prst="leftBracket">
-              <a:avLst/>
-            </a:prstGeom>
-            <a:ln w="22225">
-              <a:solidFill>
-                <a:schemeClr val="accent5">
-                  <a:lumMod val="90000"/>
-                </a:schemeClr>
-              </a:solidFill>
-            </a:ln>
-          </p:spPr>
-          <p:style>
-            <a:lnRef idx="1">
-              <a:schemeClr val="accent1"/>
-            </a:lnRef>
-            <a:fillRef idx="0">
-              <a:schemeClr val="accent1"/>
-            </a:fillRef>
-            <a:effectRef idx="0">
-              <a:schemeClr val="accent1"/>
-            </a:effectRef>
-            <a:fontRef idx="minor">
-              <a:schemeClr val="tx1"/>
-            </a:fontRef>
-          </p:style>
-          <p:txBody>
-            <a:bodyPr rtlCol="0" anchor="ctr"/>
-            <a:lstStyle/>
-            <a:p>
-              <a:pPr algn="ctr"/>
-              <a:endParaRPr lang="en-US"/>
             </a:p>
           </p:txBody>
         </p:sp>
@@ -15622,8 +14501,8 @@
         </p:nvSpPr>
         <p:spPr>
           <a:xfrm>
-            <a:off x="14682247" y="32378611"/>
-            <a:ext cx="5758289" cy="5632311"/>
+            <a:off x="14441617" y="32541896"/>
+            <a:ext cx="5758289" cy="6786473"/>
           </a:xfrm>
           <a:prstGeom prst="rect">
             <a:avLst/>
@@ -15638,7 +14517,7 @@
           <a:p>
             <a:pPr marL="457200" indent="-457200">
               <a:spcAft>
-                <a:spcPts val="1800"/>
+                <a:spcPts val="1200"/>
               </a:spcAft>
               <a:buClr>
                 <a:schemeClr val="accent3">
@@ -15650,7 +14529,7 @@
               <a:buChar char="•"/>
             </a:pPr>
             <a:r>
-              <a:rPr lang="en-US" sz="3000">
+              <a:rPr lang="en-US" sz="3000" dirty="0">
                 <a:solidFill>
                   <a:schemeClr val="tx1">
                     <a:lumMod val="85000"/>
@@ -15666,7 +14545,7 @@
           <a:p>
             <a:pPr marL="457200" indent="-457200">
               <a:spcAft>
-                <a:spcPts val="1800"/>
+                <a:spcPts val="1200"/>
               </a:spcAft>
               <a:buClr>
                 <a:schemeClr val="accent3">
@@ -15678,7 +14557,7 @@
               <a:buChar char="•"/>
             </a:pPr>
             <a:r>
-              <a:rPr lang="en-US" sz="3000">
+              <a:rPr lang="en-US" sz="3000" dirty="0">
                 <a:solidFill>
                   <a:schemeClr val="tx1">
                     <a:lumMod val="85000"/>
@@ -15694,7 +14573,7 @@
           <a:p>
             <a:pPr marL="457200" indent="-457200">
               <a:spcAft>
-                <a:spcPts val="1800"/>
+                <a:spcPts val="1200"/>
               </a:spcAft>
               <a:buClr>
                 <a:schemeClr val="accent3">
@@ -15706,7 +14585,7 @@
               <a:buChar char="•"/>
             </a:pPr>
             <a:r>
-              <a:rPr lang="en-US" sz="3000">
+              <a:rPr lang="en-US" sz="3000" dirty="0">
                 <a:solidFill>
                   <a:schemeClr val="tx1">
                     <a:lumMod val="85000"/>
@@ -15718,16 +14597,34 @@
               </a:rPr>
               <a:t>Diversity in consumption of specific food groups instead of all foods may give novel insights.</a:t>
             </a:r>
-            <a:endParaRPr lang="en-US" sz="3000" dirty="0">
-              <a:solidFill>
-                <a:schemeClr val="tx1">
-                  <a:lumMod val="85000"/>
-                  <a:lumOff val="15000"/>
+          </a:p>
+          <a:p>
+            <a:pPr marL="457200" indent="-457200">
+              <a:spcAft>
+                <a:spcPts val="1200"/>
+              </a:spcAft>
+              <a:buClr>
+                <a:schemeClr val="accent3">
+                  <a:lumMod val="75000"/>
                 </a:schemeClr>
-              </a:solidFill>
-              <a:latin typeface="Arial" panose="020B0604020202020204" pitchFamily="34" charset="0"/>
-              <a:cs typeface="Arial" panose="020B0604020202020204" pitchFamily="34" charset="0"/>
-            </a:endParaRPr>
+              </a:buClr>
+              <a:buSzPct val="130000"/>
+              <a:buFont typeface="Arial" panose="020B0604020202020204" pitchFamily="34" charset="0"/>
+              <a:buChar char="•"/>
+            </a:pPr>
+            <a:r>
+              <a:rPr lang="en-US" sz="3000" dirty="0">
+                <a:solidFill>
+                  <a:schemeClr val="tx1">
+                    <a:lumMod val="85000"/>
+                    <a:lumOff val="15000"/>
+                  </a:schemeClr>
+                </a:solidFill>
+                <a:latin typeface="Arial" panose="020B0604020202020204" pitchFamily="34" charset="0"/>
+                <a:cs typeface="Arial" panose="020B0604020202020204" pitchFamily="34" charset="0"/>
+              </a:rPr>
+              <a:t>DvGroups can further be analyzed using DietR</a:t>
+            </a:r>
           </a:p>
         </p:txBody>
       </p:sp>
@@ -15746,13 +14643,13 @@
           <p:nvPr/>
         </p:nvPicPr>
         <p:blipFill>
-          <a:blip r:embed="rId15">
+          <a:blip r:embed="rId14">
             <a:extLst>
               <a:ext uri="{28A0092B-C50C-407E-A947-70E740481C1C}">
                 <a14:useLocalDpi xmlns:a14="http://schemas.microsoft.com/office/drawing/2010/main" val="0"/>
               </a:ext>
               <a:ext uri="{96DAC541-7B7A-43D3-8B79-37D633B846F1}">
-                <asvg:svgBlip xmlns:asvg="http://schemas.microsoft.com/office/drawing/2016/SVG/main" r:embed="rId16"/>
+                <asvg:svgBlip xmlns:asvg="http://schemas.microsoft.com/office/drawing/2016/SVG/main" r:embed="rId15"/>
               </a:ext>
             </a:extLst>
           </a:blip>
@@ -15762,8 +14659,8 @@
         </p:blipFill>
         <p:spPr>
           <a:xfrm rot="21069619">
-            <a:off x="17857901" y="24162494"/>
-            <a:ext cx="990990" cy="990990"/>
+            <a:off x="18642346" y="24277188"/>
+            <a:ext cx="1071025" cy="1071025"/>
           </a:xfrm>
           <a:prstGeom prst="rect">
             <a:avLst/>
@@ -15785,13 +14682,13 @@
           <p:nvPr/>
         </p:nvPicPr>
         <p:blipFill>
-          <a:blip r:embed="rId17">
+          <a:blip r:embed="rId16">
             <a:extLst>
               <a:ext uri="{28A0092B-C50C-407E-A947-70E740481C1C}">
                 <a14:useLocalDpi xmlns:a14="http://schemas.microsoft.com/office/drawing/2010/main" val="0"/>
               </a:ext>
               <a:ext uri="{96DAC541-7B7A-43D3-8B79-37D633B846F1}">
-                <asvg:svgBlip xmlns:asvg="http://schemas.microsoft.com/office/drawing/2016/SVG/main" r:embed="rId18"/>
+                <asvg:svgBlip xmlns:asvg="http://schemas.microsoft.com/office/drawing/2016/SVG/main" r:embed="rId17"/>
               </a:ext>
             </a:extLst>
           </a:blip>
@@ -15801,46 +14698,7 @@
         </p:blipFill>
         <p:spPr>
           <a:xfrm rot="21005103">
-            <a:off x="19118966" y="23513683"/>
-            <a:ext cx="914400" cy="914400"/>
-          </a:xfrm>
-          <a:prstGeom prst="rect">
-            <a:avLst/>
-          </a:prstGeom>
-        </p:spPr>
-      </p:pic>
-      <p:pic>
-        <p:nvPicPr>
-          <p:cNvPr id="78" name="Graphic 77" descr="Seeds outline">
-            <a:extLst>
-              <a:ext uri="{FF2B5EF4-FFF2-40B4-BE49-F238E27FC236}">
-                <a16:creationId xmlns:a16="http://schemas.microsoft.com/office/drawing/2014/main" id="{C8AC5759-7CDD-7614-D29A-78ACCE2DDE12}"/>
-              </a:ext>
-            </a:extLst>
-          </p:cNvPr>
-          <p:cNvPicPr>
-            <a:picLocks noChangeAspect="1"/>
-          </p:cNvPicPr>
-          <p:nvPr/>
-        </p:nvPicPr>
-        <p:blipFill>
-          <a:blip r:embed="rId19">
-            <a:extLst>
-              <a:ext uri="{28A0092B-C50C-407E-A947-70E740481C1C}">
-                <a14:useLocalDpi xmlns:a14="http://schemas.microsoft.com/office/drawing/2010/main" val="0"/>
-              </a:ext>
-              <a:ext uri="{96DAC541-7B7A-43D3-8B79-37D633B846F1}">
-                <asvg:svgBlip xmlns:asvg="http://schemas.microsoft.com/office/drawing/2016/SVG/main" r:embed="rId20"/>
-              </a:ext>
-            </a:extLst>
-          </a:blip>
-          <a:stretch>
-            <a:fillRect/>
-          </a:stretch>
-        </p:blipFill>
-        <p:spPr>
-          <a:xfrm rot="265782">
-            <a:off x="18130591" y="22858057"/>
+            <a:off x="19101886" y="23339944"/>
             <a:ext cx="914400" cy="914400"/>
           </a:xfrm>
           <a:prstGeom prst="rect">
@@ -15863,18 +14721,18 @@
           <p:nvPr>
             <p:extLst>
               <p:ext uri="{D42A27DB-BD31-4B8C-83A1-F6EECF244321}">
-                <p14:modId xmlns:p14="http://schemas.microsoft.com/office/powerpoint/2010/main" val="4113355531"/>
+                <p14:modId xmlns:p14="http://schemas.microsoft.com/office/powerpoint/2010/main" val="259342966"/>
               </p:ext>
             </p:extLst>
           </p:nvPr>
         </p:nvGraphicFramePr>
         <p:xfrm>
-          <a:off x="7991724" y="32521185"/>
+          <a:off x="7751094" y="32684470"/>
           <a:ext cx="6378779" cy="5560952"/>
         </p:xfrm>
         <a:graphic>
           <a:graphicData uri="http://schemas.openxmlformats.org/drawingml/2006/chart">
-            <c:chart xmlns:c="http://schemas.openxmlformats.org/drawingml/2006/chart" xmlns:r="http://schemas.openxmlformats.org/officeDocument/2006/relationships" r:id="rId21"/>
+            <c:chart xmlns:c="http://schemas.openxmlformats.org/drawingml/2006/chart" xmlns:r="http://schemas.openxmlformats.org/officeDocument/2006/relationships" r:id="rId18"/>
           </a:graphicData>
         </a:graphic>
       </p:graphicFrame>
@@ -15892,7 +14750,7 @@
         </p:nvSpPr>
         <p:spPr>
           <a:xfrm rot="5400000">
-            <a:off x="10598124" y="34099333"/>
+            <a:off x="10357494" y="34262618"/>
             <a:ext cx="189006" cy="1282144"/>
           </a:xfrm>
           <a:prstGeom prst="leftBracket">
@@ -15925,7 +14783,7 @@
           <a:lstStyle/>
           <a:p>
             <a:pPr algn="ctr"/>
-            <a:endParaRPr lang="en-US"/>
+            <a:endParaRPr lang="en-US" dirty="0"/>
           </a:p>
         </p:txBody>
       </p:sp>
@@ -15943,7 +14801,7 @@
         </p:nvSpPr>
         <p:spPr>
           <a:xfrm>
-            <a:off x="11608177" y="33589472"/>
+            <a:off x="11367547" y="33752757"/>
             <a:ext cx="1754858" cy="461665"/>
           </a:xfrm>
           <a:prstGeom prst="rect">
@@ -15966,7 +14824,7 @@
               <a:buSzPct val="130000"/>
             </a:pPr>
             <a:r>
-              <a:rPr lang="en-US" sz="2400">
+              <a:rPr lang="en-US" sz="2400" dirty="0">
                 <a:solidFill>
                   <a:schemeClr val="tx1">
                     <a:lumMod val="65000"/>
@@ -15978,16 +14836,6 @@
               </a:rPr>
               <a:t>&lt; 0.001</a:t>
             </a:r>
-            <a:endParaRPr lang="en-US" sz="2400" dirty="0">
-              <a:solidFill>
-                <a:schemeClr val="tx1">
-                  <a:lumMod val="65000"/>
-                  <a:lumOff val="35000"/>
-                </a:schemeClr>
-              </a:solidFill>
-              <a:latin typeface="Arial" panose="020B0604020202020204" pitchFamily="34" charset="0"/>
-              <a:cs typeface="Arial" panose="020B0604020202020204" pitchFamily="34" charset="0"/>
-            </a:endParaRPr>
           </a:p>
         </p:txBody>
       </p:sp>
@@ -16005,7 +14853,7 @@
         </p:nvSpPr>
         <p:spPr>
           <a:xfrm rot="5400000">
-            <a:off x="12393087" y="32814994"/>
+            <a:off x="12152457" y="32978279"/>
             <a:ext cx="189006" cy="2560320"/>
           </a:xfrm>
           <a:prstGeom prst="leftBracket">
@@ -16038,7 +14886,7 @@
           <a:lstStyle/>
           <a:p>
             <a:pPr algn="ctr"/>
-            <a:endParaRPr lang="en-US"/>
+            <a:endParaRPr lang="en-US" dirty="0"/>
           </a:p>
         </p:txBody>
       </p:sp>
@@ -16056,7 +14904,7 @@
         </p:nvSpPr>
         <p:spPr>
           <a:xfrm>
-            <a:off x="11015801" y="33048939"/>
+            <a:off x="10775171" y="33212224"/>
             <a:ext cx="1754858" cy="461665"/>
           </a:xfrm>
           <a:prstGeom prst="rect">
@@ -16079,7 +14927,7 @@
               <a:buSzPct val="130000"/>
             </a:pPr>
             <a:r>
-              <a:rPr lang="en-US" sz="2400">
+              <a:rPr lang="en-US" sz="2400" dirty="0">
                 <a:solidFill>
                   <a:schemeClr val="tx1">
                     <a:lumMod val="65000"/>
@@ -16091,16 +14939,6 @@
               </a:rPr>
               <a:t>&lt; 0.0001</a:t>
             </a:r>
-            <a:endParaRPr lang="en-US" sz="2400" dirty="0">
-              <a:solidFill>
-                <a:schemeClr val="tx1">
-                  <a:lumMod val="65000"/>
-                  <a:lumOff val="35000"/>
-                </a:schemeClr>
-              </a:solidFill>
-              <a:latin typeface="Arial" panose="020B0604020202020204" pitchFamily="34" charset="0"/>
-              <a:cs typeface="Arial" panose="020B0604020202020204" pitchFamily="34" charset="0"/>
-            </a:endParaRPr>
           </a:p>
         </p:txBody>
       </p:sp>
@@ -16118,7 +14956,7 @@
         </p:nvSpPr>
         <p:spPr>
           <a:xfrm rot="5400000">
-            <a:off x="11798727" y="31701789"/>
+            <a:off x="11558097" y="31865074"/>
             <a:ext cx="189006" cy="3749040"/>
           </a:xfrm>
           <a:prstGeom prst="leftBracket">
@@ -16151,7 +14989,7 @@
           <a:lstStyle/>
           <a:p>
             <a:pPr algn="ctr"/>
-            <a:endParaRPr lang="en-US"/>
+            <a:endParaRPr lang="en-US" dirty="0"/>
           </a:p>
         </p:txBody>
       </p:sp>
@@ -16169,7 +15007,7 @@
         </p:nvSpPr>
         <p:spPr>
           <a:xfrm>
-            <a:off x="9812231" y="34241154"/>
+            <a:off x="9571601" y="34404439"/>
             <a:ext cx="1754858" cy="461665"/>
           </a:xfrm>
           <a:prstGeom prst="rect">
@@ -16192,7 +15030,7 @@
               <a:buSzPct val="130000"/>
             </a:pPr>
             <a:r>
-              <a:rPr lang="en-US" sz="2400">
+              <a:rPr lang="en-US" sz="2400" dirty="0">
                 <a:solidFill>
                   <a:schemeClr val="tx1">
                     <a:lumMod val="65000"/>
@@ -16204,19 +15042,87 @@
               </a:rPr>
               <a:t>&lt; 0.01</a:t>
             </a:r>
-            <a:endParaRPr lang="en-US" sz="2400" dirty="0">
-              <a:solidFill>
-                <a:schemeClr val="tx1">
-                  <a:lumMod val="65000"/>
-                  <a:lumOff val="35000"/>
-                </a:schemeClr>
-              </a:solidFill>
-              <a:latin typeface="Arial" panose="020B0604020202020204" pitchFamily="34" charset="0"/>
-              <a:cs typeface="Arial" panose="020B0604020202020204" pitchFamily="34" charset="0"/>
-            </a:endParaRPr>
-          </a:p>
-        </p:txBody>
-      </p:sp>
+          </a:p>
+        </p:txBody>
+      </p:sp>
+      <p:pic>
+        <p:nvPicPr>
+          <p:cNvPr id="14" name="Graphic 13">
+            <a:extLst>
+              <a:ext uri="{FF2B5EF4-FFF2-40B4-BE49-F238E27FC236}">
+                <a16:creationId xmlns:a16="http://schemas.microsoft.com/office/drawing/2014/main" id="{E6FD603F-87EB-CA89-16E6-E0ED2EC3A65B}"/>
+              </a:ext>
+            </a:extLst>
+          </p:cNvPr>
+          <p:cNvPicPr>
+            <a:picLocks noChangeAspect="1"/>
+          </p:cNvPicPr>
+          <p:nvPr/>
+        </p:nvPicPr>
+        <p:blipFill>
+          <a:blip r:embed="rId19">
+            <a:extLst>
+              <a:ext uri="{28A0092B-C50C-407E-A947-70E740481C1C}">
+                <a14:useLocalDpi xmlns:a14="http://schemas.microsoft.com/office/drawing/2010/main" val="0"/>
+              </a:ext>
+              <a:ext uri="{96DAC541-7B7A-43D3-8B79-37D633B846F1}">
+                <asvg:svgBlip xmlns:asvg="http://schemas.microsoft.com/office/drawing/2016/SVG/main" r:embed="rId20"/>
+              </a:ext>
+            </a:extLst>
+          </a:blip>
+          <a:stretch>
+            <a:fillRect/>
+          </a:stretch>
+        </p:blipFill>
+        <p:spPr>
+          <a:xfrm>
+            <a:off x="26282644" y="23978663"/>
+            <a:ext cx="819863" cy="819863"/>
+          </a:xfrm>
+          <a:prstGeom prst="rect">
+            <a:avLst/>
+          </a:prstGeom>
+        </p:spPr>
+      </p:pic>
+      <p:pic>
+        <p:nvPicPr>
+          <p:cNvPr id="22" name="Graphic 21">
+            <a:extLst>
+              <a:ext uri="{FF2B5EF4-FFF2-40B4-BE49-F238E27FC236}">
+                <a16:creationId xmlns:a16="http://schemas.microsoft.com/office/drawing/2014/main" id="{F5EAA6B5-AF94-9269-1236-D8F0432591EE}"/>
+              </a:ext>
+            </a:extLst>
+          </p:cNvPr>
+          <p:cNvPicPr>
+            <a:picLocks noChangeAspect="1"/>
+          </p:cNvPicPr>
+          <p:nvPr/>
+        </p:nvPicPr>
+        <p:blipFill>
+          <a:blip r:embed="rId21">
+            <a:extLst>
+              <a:ext uri="{28A0092B-C50C-407E-A947-70E740481C1C}">
+                <a14:useLocalDpi xmlns:a14="http://schemas.microsoft.com/office/drawing/2010/main" val="0"/>
+              </a:ext>
+              <a:ext uri="{96DAC541-7B7A-43D3-8B79-37D633B846F1}">
+                <asvg:svgBlip xmlns:asvg="http://schemas.microsoft.com/office/drawing/2016/SVG/main" r:embed="rId22"/>
+              </a:ext>
+            </a:extLst>
+          </a:blip>
+          <a:stretch>
+            <a:fillRect/>
+          </a:stretch>
+        </p:blipFill>
+        <p:spPr>
+          <a:xfrm>
+            <a:off x="24470829" y="22435763"/>
+            <a:ext cx="815045" cy="815045"/>
+          </a:xfrm>
+          <a:prstGeom prst="rect">
+            <a:avLst/>
+          </a:prstGeom>
+        </p:spPr>
+      </p:pic>
     </p:spTree>
     <p:extLst>
       <p:ext uri="{BB962C8B-B14F-4D97-AF65-F5344CB8AC3E}">
@@ -16528,7 +15434,7 @@
 <file path=ppt/theme/theme2.xml><?xml version="1.0" encoding="utf-8"?>
 <a:theme xmlns:a="http://schemas.openxmlformats.org/drawingml/2006/main" name="Office Theme">
   <a:themeElements>
-    <a:clrScheme name="Rainbow2">
+    <a:clrScheme name="Slipstream">
       <a:dk1>
         <a:sysClr val="windowText" lastClr="000000"/>
       </a:dk1>
@@ -16536,34 +15442,34 @@
         <a:sysClr val="window" lastClr="FFFFFF"/>
       </a:lt1>
       <a:dk2>
-        <a:srgbClr val="8064A2"/>
+        <a:srgbClr val="212745"/>
       </a:dk2>
       <a:lt2>
-        <a:srgbClr val="1F497D"/>
+        <a:srgbClr val="B4DCFA"/>
       </a:lt2>
       <a:accent1>
-        <a:srgbClr val="4BACC6"/>
+        <a:srgbClr val="4E67C8"/>
       </a:accent1>
       <a:accent2>
-        <a:srgbClr val="70AD47"/>
+        <a:srgbClr val="5ECCF3"/>
       </a:accent2>
       <a:accent3>
-        <a:srgbClr val="F79646"/>
+        <a:srgbClr val="A7EA52"/>
       </a:accent3>
       <a:accent4>
-        <a:srgbClr val="FFC000"/>
+        <a:srgbClr val="5DCEAF"/>
       </a:accent4>
       <a:accent5>
-        <a:srgbClr val="FFCCCC"/>
+        <a:srgbClr val="FF8021"/>
       </a:accent5>
       <a:accent6>
-        <a:srgbClr val="C0504D"/>
+        <a:srgbClr val="F14124"/>
       </a:accent6>
       <a:hlink>
-        <a:srgbClr val="0000FF"/>
+        <a:srgbClr val="56C7AA"/>
       </a:hlink>
       <a:folHlink>
-        <a:srgbClr val="800080"/>
+        <a:srgbClr val="59A8D1"/>
       </a:folHlink>
     </a:clrScheme>
     <a:fontScheme name="Office Theme">

</xml_diff>